<commit_message>
Add GUI class diagrams.
</commit_message>
<xml_diff>
--- a/Class UML diagrams/Controller.pptx
+++ b/Class UML diagrams/Controller.pptx
@@ -5,19 +5,21 @@
     <p:sldMasterId id="2147483648" r:id="rId1"/>
   </p:sldMasterIdLst>
   <p:notesMasterIdLst>
-    <p:notesMasterId r:id="rId3"/>
+    <p:notesMasterId r:id="rId5"/>
   </p:notesMasterIdLst>
   <p:sldIdLst>
     <p:sldId id="256" r:id="rId2"/>
+    <p:sldId id="257" r:id="rId3"/>
+    <p:sldId id="258" r:id="rId4"/>
   </p:sldIdLst>
-  <p:sldSz cx="9144000" cy="6858000" type="screen4x3"/>
+  <p:sldSz cx="9144000" cy="5715000" type="screen16x10"/>
   <p:notesSz cx="6858000" cy="9144000"/>
   <p:defaultTextStyle>
     <a:defPPr>
       <a:defRPr lang="en-US"/>
     </a:defPPr>
-    <a:lvl1pPr marL="0" algn="l" defTabSz="457200" rtl="0" eaLnBrk="1" latinLnBrk="0" hangingPunct="1">
-      <a:defRPr sz="1800" kern="1200">
+    <a:lvl1pPr marL="0" algn="l" defTabSz="424508" rtl="0" eaLnBrk="1" latinLnBrk="0" hangingPunct="1">
+      <a:defRPr sz="1700" kern="1200">
         <a:solidFill>
           <a:schemeClr val="tx1"/>
         </a:solidFill>
@@ -26,8 +28,8 @@
         <a:cs typeface="+mn-cs"/>
       </a:defRPr>
     </a:lvl1pPr>
-    <a:lvl2pPr marL="457200" algn="l" defTabSz="457200" rtl="0" eaLnBrk="1" latinLnBrk="0" hangingPunct="1">
-      <a:defRPr sz="1800" kern="1200">
+    <a:lvl2pPr marL="424508" algn="l" defTabSz="424508" rtl="0" eaLnBrk="1" latinLnBrk="0" hangingPunct="1">
+      <a:defRPr sz="1700" kern="1200">
         <a:solidFill>
           <a:schemeClr val="tx1"/>
         </a:solidFill>
@@ -36,8 +38,8 @@
         <a:cs typeface="+mn-cs"/>
       </a:defRPr>
     </a:lvl2pPr>
-    <a:lvl3pPr marL="914400" algn="l" defTabSz="457200" rtl="0" eaLnBrk="1" latinLnBrk="0" hangingPunct="1">
-      <a:defRPr sz="1800" kern="1200">
+    <a:lvl3pPr marL="849017" algn="l" defTabSz="424508" rtl="0" eaLnBrk="1" latinLnBrk="0" hangingPunct="1">
+      <a:defRPr sz="1700" kern="1200">
         <a:solidFill>
           <a:schemeClr val="tx1"/>
         </a:solidFill>
@@ -46,8 +48,8 @@
         <a:cs typeface="+mn-cs"/>
       </a:defRPr>
     </a:lvl3pPr>
-    <a:lvl4pPr marL="1371600" algn="l" defTabSz="457200" rtl="0" eaLnBrk="1" latinLnBrk="0" hangingPunct="1">
-      <a:defRPr sz="1800" kern="1200">
+    <a:lvl4pPr marL="1273525" algn="l" defTabSz="424508" rtl="0" eaLnBrk="1" latinLnBrk="0" hangingPunct="1">
+      <a:defRPr sz="1700" kern="1200">
         <a:solidFill>
           <a:schemeClr val="tx1"/>
         </a:solidFill>
@@ -56,8 +58,8 @@
         <a:cs typeface="+mn-cs"/>
       </a:defRPr>
     </a:lvl4pPr>
-    <a:lvl5pPr marL="1828800" algn="l" defTabSz="457200" rtl="0" eaLnBrk="1" latinLnBrk="0" hangingPunct="1">
-      <a:defRPr sz="1800" kern="1200">
+    <a:lvl5pPr marL="1698033" algn="l" defTabSz="424508" rtl="0" eaLnBrk="1" latinLnBrk="0" hangingPunct="1">
+      <a:defRPr sz="1700" kern="1200">
         <a:solidFill>
           <a:schemeClr val="tx1"/>
         </a:solidFill>
@@ -66,8 +68,8 @@
         <a:cs typeface="+mn-cs"/>
       </a:defRPr>
     </a:lvl5pPr>
-    <a:lvl6pPr marL="2286000" algn="l" defTabSz="457200" rtl="0" eaLnBrk="1" latinLnBrk="0" hangingPunct="1">
-      <a:defRPr sz="1800" kern="1200">
+    <a:lvl6pPr marL="2122541" algn="l" defTabSz="424508" rtl="0" eaLnBrk="1" latinLnBrk="0" hangingPunct="1">
+      <a:defRPr sz="1700" kern="1200">
         <a:solidFill>
           <a:schemeClr val="tx1"/>
         </a:solidFill>
@@ -76,8 +78,8 @@
         <a:cs typeface="+mn-cs"/>
       </a:defRPr>
     </a:lvl6pPr>
-    <a:lvl7pPr marL="2743200" algn="l" defTabSz="457200" rtl="0" eaLnBrk="1" latinLnBrk="0" hangingPunct="1">
-      <a:defRPr sz="1800" kern="1200">
+    <a:lvl7pPr marL="2547049" algn="l" defTabSz="424508" rtl="0" eaLnBrk="1" latinLnBrk="0" hangingPunct="1">
+      <a:defRPr sz="1700" kern="1200">
         <a:solidFill>
           <a:schemeClr val="tx1"/>
         </a:solidFill>
@@ -86,8 +88,8 @@
         <a:cs typeface="+mn-cs"/>
       </a:defRPr>
     </a:lvl7pPr>
-    <a:lvl8pPr marL="3200400" algn="l" defTabSz="457200" rtl="0" eaLnBrk="1" latinLnBrk="0" hangingPunct="1">
-      <a:defRPr sz="1800" kern="1200">
+    <a:lvl8pPr marL="2971557" algn="l" defTabSz="424508" rtl="0" eaLnBrk="1" latinLnBrk="0" hangingPunct="1">
+      <a:defRPr sz="1700" kern="1200">
         <a:solidFill>
           <a:schemeClr val="tx1"/>
         </a:solidFill>
@@ -96,8 +98,8 @@
         <a:cs typeface="+mn-cs"/>
       </a:defRPr>
     </a:lvl8pPr>
-    <a:lvl9pPr marL="3657600" algn="l" defTabSz="457200" rtl="0" eaLnBrk="1" latinLnBrk="0" hangingPunct="1">
-      <a:defRPr sz="1800" kern="1200">
+    <a:lvl9pPr marL="3396065" algn="l" defTabSz="424508" rtl="0" eaLnBrk="1" latinLnBrk="0" hangingPunct="1">
+      <a:defRPr sz="1700" kern="1200">
         <a:solidFill>
           <a:schemeClr val="tx1"/>
         </a:solidFill>
@@ -210,8 +212,8 @@
         </p:nvSpPr>
         <p:spPr>
           <a:xfrm>
-            <a:off x="1143000" y="685800"/>
-            <a:ext cx="4572000" cy="3429000"/>
+            <a:off x="685800" y="685800"/>
+            <a:ext cx="5486400" cy="3429000"/>
           </a:xfrm>
           <a:prstGeom prst="rect">
             <a:avLst/>
@@ -366,8 +368,8 @@
   </p:cSld>
   <p:clrMap bg1="lt1" tx1="dk1" bg2="lt2" tx2="dk2" accent1="accent1" accent2="accent2" accent3="accent3" accent4="accent4" accent5="accent5" accent6="accent6" hlink="hlink" folHlink="folHlink"/>
   <p:notesStyle>
-    <a:lvl1pPr marL="0" algn="l" defTabSz="457200" rtl="0" eaLnBrk="1" latinLnBrk="0" hangingPunct="1">
-      <a:defRPr sz="1200" kern="1200">
+    <a:lvl1pPr marL="0" algn="l" defTabSz="424508" rtl="0" eaLnBrk="1" latinLnBrk="0" hangingPunct="1">
+      <a:defRPr sz="1100" kern="1200">
         <a:solidFill>
           <a:schemeClr val="tx1"/>
         </a:solidFill>
@@ -376,8 +378,8 @@
         <a:cs typeface="+mn-cs"/>
       </a:defRPr>
     </a:lvl1pPr>
-    <a:lvl2pPr marL="457200" algn="l" defTabSz="457200" rtl="0" eaLnBrk="1" latinLnBrk="0" hangingPunct="1">
-      <a:defRPr sz="1200" kern="1200">
+    <a:lvl2pPr marL="424508" algn="l" defTabSz="424508" rtl="0" eaLnBrk="1" latinLnBrk="0" hangingPunct="1">
+      <a:defRPr sz="1100" kern="1200">
         <a:solidFill>
           <a:schemeClr val="tx1"/>
         </a:solidFill>
@@ -386,8 +388,8 @@
         <a:cs typeface="+mn-cs"/>
       </a:defRPr>
     </a:lvl2pPr>
-    <a:lvl3pPr marL="914400" algn="l" defTabSz="457200" rtl="0" eaLnBrk="1" latinLnBrk="0" hangingPunct="1">
-      <a:defRPr sz="1200" kern="1200">
+    <a:lvl3pPr marL="849017" algn="l" defTabSz="424508" rtl="0" eaLnBrk="1" latinLnBrk="0" hangingPunct="1">
+      <a:defRPr sz="1100" kern="1200">
         <a:solidFill>
           <a:schemeClr val="tx1"/>
         </a:solidFill>
@@ -396,8 +398,8 @@
         <a:cs typeface="+mn-cs"/>
       </a:defRPr>
     </a:lvl3pPr>
-    <a:lvl4pPr marL="1371600" algn="l" defTabSz="457200" rtl="0" eaLnBrk="1" latinLnBrk="0" hangingPunct="1">
-      <a:defRPr sz="1200" kern="1200">
+    <a:lvl4pPr marL="1273525" algn="l" defTabSz="424508" rtl="0" eaLnBrk="1" latinLnBrk="0" hangingPunct="1">
+      <a:defRPr sz="1100" kern="1200">
         <a:solidFill>
           <a:schemeClr val="tx1"/>
         </a:solidFill>
@@ -406,8 +408,8 @@
         <a:cs typeface="+mn-cs"/>
       </a:defRPr>
     </a:lvl4pPr>
-    <a:lvl5pPr marL="1828800" algn="l" defTabSz="457200" rtl="0" eaLnBrk="1" latinLnBrk="0" hangingPunct="1">
-      <a:defRPr sz="1200" kern="1200">
+    <a:lvl5pPr marL="1698033" algn="l" defTabSz="424508" rtl="0" eaLnBrk="1" latinLnBrk="0" hangingPunct="1">
+      <a:defRPr sz="1100" kern="1200">
         <a:solidFill>
           <a:schemeClr val="tx1"/>
         </a:solidFill>
@@ -416,8 +418,8 @@
         <a:cs typeface="+mn-cs"/>
       </a:defRPr>
     </a:lvl5pPr>
-    <a:lvl6pPr marL="2286000" algn="l" defTabSz="457200" rtl="0" eaLnBrk="1" latinLnBrk="0" hangingPunct="1">
-      <a:defRPr sz="1200" kern="1200">
+    <a:lvl6pPr marL="2122541" algn="l" defTabSz="424508" rtl="0" eaLnBrk="1" latinLnBrk="0" hangingPunct="1">
+      <a:defRPr sz="1100" kern="1200">
         <a:solidFill>
           <a:schemeClr val="tx1"/>
         </a:solidFill>
@@ -426,8 +428,8 @@
         <a:cs typeface="+mn-cs"/>
       </a:defRPr>
     </a:lvl6pPr>
-    <a:lvl7pPr marL="2743200" algn="l" defTabSz="457200" rtl="0" eaLnBrk="1" latinLnBrk="0" hangingPunct="1">
-      <a:defRPr sz="1200" kern="1200">
+    <a:lvl7pPr marL="2547049" algn="l" defTabSz="424508" rtl="0" eaLnBrk="1" latinLnBrk="0" hangingPunct="1">
+      <a:defRPr sz="1100" kern="1200">
         <a:solidFill>
           <a:schemeClr val="tx1"/>
         </a:solidFill>
@@ -436,8 +438,8 @@
         <a:cs typeface="+mn-cs"/>
       </a:defRPr>
     </a:lvl7pPr>
-    <a:lvl8pPr marL="3200400" algn="l" defTabSz="457200" rtl="0" eaLnBrk="1" latinLnBrk="0" hangingPunct="1">
-      <a:defRPr sz="1200" kern="1200">
+    <a:lvl8pPr marL="2971557" algn="l" defTabSz="424508" rtl="0" eaLnBrk="1" latinLnBrk="0" hangingPunct="1">
+      <a:defRPr sz="1100" kern="1200">
         <a:solidFill>
           <a:schemeClr val="tx1"/>
         </a:solidFill>
@@ -446,8 +448,8 @@
         <a:cs typeface="+mn-cs"/>
       </a:defRPr>
     </a:lvl8pPr>
-    <a:lvl9pPr marL="3657600" algn="l" defTabSz="457200" rtl="0" eaLnBrk="1" latinLnBrk="0" hangingPunct="1">
-      <a:defRPr sz="1200" kern="1200">
+    <a:lvl9pPr marL="3396065" algn="l" defTabSz="424508" rtl="0" eaLnBrk="1" latinLnBrk="0" hangingPunct="1">
+      <a:defRPr sz="1100" kern="1200">
         <a:solidFill>
           <a:schemeClr val="tx1"/>
         </a:solidFill>
@@ -487,7 +489,12 @@
             <p:ph type="sldImg"/>
           </p:nvPr>
         </p:nvSpPr>
-        <p:spPr/>
+        <p:spPr>
+          <a:xfrm>
+            <a:off x="685800" y="685800"/>
+            <a:ext cx="5486400" cy="3429000"/>
+          </a:xfrm>
+        </p:spPr>
       </p:sp>
       <p:sp>
         <p:nvSpPr>
@@ -573,8 +580,8 @@
         </p:nvSpPr>
         <p:spPr>
           <a:xfrm>
-            <a:off x="685800" y="2130425"/>
-            <a:ext cx="7772400" cy="1470025"/>
+            <a:off x="685800" y="1775355"/>
+            <a:ext cx="7772400" cy="1225021"/>
           </a:xfrm>
         </p:spPr>
         <p:txBody>
@@ -601,8 +608,8 @@
         </p:nvSpPr>
         <p:spPr>
           <a:xfrm>
-            <a:off x="1371600" y="3886200"/>
-            <a:ext cx="6400800" cy="1752600"/>
+            <a:off x="1371600" y="3238500"/>
+            <a:ext cx="6400800" cy="1460500"/>
           </a:xfrm>
         </p:spPr>
         <p:txBody>
@@ -618,7 +625,7 @@
                 </a:solidFill>
               </a:defRPr>
             </a:lvl1pPr>
-            <a:lvl2pPr marL="457200" indent="0" algn="ctr">
+            <a:lvl2pPr marL="424508" indent="0" algn="ctr">
               <a:buNone/>
               <a:defRPr>
                 <a:solidFill>
@@ -628,7 +635,7 @@
                 </a:solidFill>
               </a:defRPr>
             </a:lvl2pPr>
-            <a:lvl3pPr marL="914400" indent="0" algn="ctr">
+            <a:lvl3pPr marL="849017" indent="0" algn="ctr">
               <a:buNone/>
               <a:defRPr>
                 <a:solidFill>
@@ -638,7 +645,7 @@
                 </a:solidFill>
               </a:defRPr>
             </a:lvl3pPr>
-            <a:lvl4pPr marL="1371600" indent="0" algn="ctr">
+            <a:lvl4pPr marL="1273525" indent="0" algn="ctr">
               <a:buNone/>
               <a:defRPr>
                 <a:solidFill>
@@ -648,7 +655,7 @@
                 </a:solidFill>
               </a:defRPr>
             </a:lvl4pPr>
-            <a:lvl5pPr marL="1828800" indent="0" algn="ctr">
+            <a:lvl5pPr marL="1698033" indent="0" algn="ctr">
               <a:buNone/>
               <a:defRPr>
                 <a:solidFill>
@@ -658,7 +665,7 @@
                 </a:solidFill>
               </a:defRPr>
             </a:lvl5pPr>
-            <a:lvl6pPr marL="2286000" indent="0" algn="ctr">
+            <a:lvl6pPr marL="2122541" indent="0" algn="ctr">
               <a:buNone/>
               <a:defRPr>
                 <a:solidFill>
@@ -668,7 +675,7 @@
                 </a:solidFill>
               </a:defRPr>
             </a:lvl6pPr>
-            <a:lvl7pPr marL="2743200" indent="0" algn="ctr">
+            <a:lvl7pPr marL="2547049" indent="0" algn="ctr">
               <a:buNone/>
               <a:defRPr>
                 <a:solidFill>
@@ -678,7 +685,7 @@
                 </a:solidFill>
               </a:defRPr>
             </a:lvl7pPr>
-            <a:lvl8pPr marL="3200400" indent="0" algn="ctr">
+            <a:lvl8pPr marL="2971557" indent="0" algn="ctr">
               <a:buNone/>
               <a:defRPr>
                 <a:solidFill>
@@ -688,7 +695,7 @@
                 </a:solidFill>
               </a:defRPr>
             </a:lvl8pPr>
-            <a:lvl9pPr marL="3657600" indent="0" algn="ctr">
+            <a:lvl9pPr marL="3396065" indent="0" algn="ctr">
               <a:buNone/>
               <a:defRPr>
                 <a:solidFill>
@@ -725,7 +732,7 @@
           <a:p>
             <a:fld id="{E1D2620B-6619-314E-A368-62BBC874E253}" type="datetimeFigureOut">
               <a:rPr lang="en-US" smtClean="0"/>
-              <a:t>22/03/14</a:t>
+              <a:t>23/03/14</a:t>
             </a:fld>
             <a:endParaRPr lang="en-US" dirty="0"/>
           </a:p>
@@ -895,7 +902,7 @@
           <a:p>
             <a:fld id="{E1D2620B-6619-314E-A368-62BBC874E253}" type="datetimeFigureOut">
               <a:rPr lang="en-US" smtClean="0"/>
-              <a:t>22/03/14</a:t>
+              <a:t>23/03/14</a:t>
             </a:fld>
             <a:endParaRPr lang="en-US" dirty="0"/>
           </a:p>
@@ -985,8 +992,8 @@
         </p:nvSpPr>
         <p:spPr>
           <a:xfrm>
-            <a:off x="6629400" y="274638"/>
-            <a:ext cx="2057400" cy="5851525"/>
+            <a:off x="6629400" y="228866"/>
+            <a:ext cx="2057400" cy="4876271"/>
           </a:xfrm>
         </p:spPr>
         <p:txBody>
@@ -1013,8 +1020,8 @@
         </p:nvSpPr>
         <p:spPr>
           <a:xfrm>
-            <a:off x="457200" y="274638"/>
-            <a:ext cx="6019800" cy="5851525"/>
+            <a:off x="457200" y="228866"/>
+            <a:ext cx="6019800" cy="4876271"/>
           </a:xfrm>
         </p:spPr>
         <p:txBody>
@@ -1075,7 +1082,7 @@
           <a:p>
             <a:fld id="{E1D2620B-6619-314E-A368-62BBC874E253}" type="datetimeFigureOut">
               <a:rPr lang="en-US" smtClean="0"/>
-              <a:t>22/03/14</a:t>
+              <a:t>23/03/14</a:t>
             </a:fld>
             <a:endParaRPr lang="en-US" dirty="0"/>
           </a:p>
@@ -1245,7 +1252,7 @@
           <a:p>
             <a:fld id="{E1D2620B-6619-314E-A368-62BBC874E253}" type="datetimeFigureOut">
               <a:rPr lang="en-US" smtClean="0"/>
-              <a:t>22/03/14</a:t>
+              <a:t>23/03/14</a:t>
             </a:fld>
             <a:endParaRPr lang="en-US" dirty="0"/>
           </a:p>
@@ -1335,15 +1342,15 @@
         </p:nvSpPr>
         <p:spPr>
           <a:xfrm>
-            <a:off x="722313" y="4406900"/>
-            <a:ext cx="7772400" cy="1362075"/>
+            <a:off x="722313" y="3672418"/>
+            <a:ext cx="7772400" cy="1135062"/>
           </a:xfrm>
         </p:spPr>
         <p:txBody>
           <a:bodyPr anchor="t"/>
           <a:lstStyle>
             <a:lvl1pPr algn="l">
-              <a:defRPr sz="4000" b="1" cap="all"/>
+              <a:defRPr sz="3700" b="1" cap="all"/>
             </a:lvl1pPr>
           </a:lstStyle>
           <a:p>
@@ -1367,8 +1374,8 @@
         </p:nvSpPr>
         <p:spPr>
           <a:xfrm>
-            <a:off x="722313" y="2906713"/>
-            <a:ext cx="7772400" cy="1500187"/>
+            <a:off x="722313" y="2422261"/>
+            <a:ext cx="7772400" cy="1250156"/>
           </a:xfrm>
         </p:spPr>
         <p:txBody>
@@ -1376,7 +1383,7 @@
           <a:lstStyle>
             <a:lvl1pPr marL="0" indent="0">
               <a:buNone/>
-              <a:defRPr sz="2000">
+              <a:defRPr sz="1900">
                 <a:solidFill>
                   <a:schemeClr val="tx1">
                     <a:tint val="75000"/>
@@ -1384,9 +1391,9 @@
                 </a:solidFill>
               </a:defRPr>
             </a:lvl1pPr>
-            <a:lvl2pPr marL="457200" indent="0">
+            <a:lvl2pPr marL="424508" indent="0">
               <a:buNone/>
-              <a:defRPr sz="1800">
+              <a:defRPr sz="1700">
                 <a:solidFill>
                   <a:schemeClr val="tx1">
                     <a:tint val="75000"/>
@@ -1394,17 +1401,7 @@
                 </a:solidFill>
               </a:defRPr>
             </a:lvl2pPr>
-            <a:lvl3pPr marL="914400" indent="0">
-              <a:buNone/>
-              <a:defRPr sz="1600">
-                <a:solidFill>
-                  <a:schemeClr val="tx1">
-                    <a:tint val="75000"/>
-                  </a:schemeClr>
-                </a:solidFill>
-              </a:defRPr>
-            </a:lvl3pPr>
-            <a:lvl4pPr marL="1371600" indent="0">
+            <a:lvl3pPr marL="849017" indent="0">
               <a:buNone/>
               <a:defRPr sz="1400">
                 <a:solidFill>
@@ -1413,10 +1410,20 @@
                   </a:schemeClr>
                 </a:solidFill>
               </a:defRPr>
+            </a:lvl3pPr>
+            <a:lvl4pPr marL="1273525" indent="0">
+              <a:buNone/>
+              <a:defRPr sz="1300">
+                <a:solidFill>
+                  <a:schemeClr val="tx1">
+                    <a:tint val="75000"/>
+                  </a:schemeClr>
+                </a:solidFill>
+              </a:defRPr>
             </a:lvl4pPr>
-            <a:lvl5pPr marL="1828800" indent="0">
+            <a:lvl5pPr marL="1698033" indent="0">
               <a:buNone/>
-              <a:defRPr sz="1400">
+              <a:defRPr sz="1300">
                 <a:solidFill>
                   <a:schemeClr val="tx1">
                     <a:tint val="75000"/>
@@ -1424,9 +1431,9 @@
                 </a:solidFill>
               </a:defRPr>
             </a:lvl5pPr>
-            <a:lvl6pPr marL="2286000" indent="0">
+            <a:lvl6pPr marL="2122541" indent="0">
               <a:buNone/>
-              <a:defRPr sz="1400">
+              <a:defRPr sz="1300">
                 <a:solidFill>
                   <a:schemeClr val="tx1">
                     <a:tint val="75000"/>
@@ -1434,9 +1441,9 @@
                 </a:solidFill>
               </a:defRPr>
             </a:lvl6pPr>
-            <a:lvl7pPr marL="2743200" indent="0">
+            <a:lvl7pPr marL="2547049" indent="0">
               <a:buNone/>
-              <a:defRPr sz="1400">
+              <a:defRPr sz="1300">
                 <a:solidFill>
                   <a:schemeClr val="tx1">
                     <a:tint val="75000"/>
@@ -1444,9 +1451,9 @@
                 </a:solidFill>
               </a:defRPr>
             </a:lvl7pPr>
-            <a:lvl8pPr marL="3200400" indent="0">
+            <a:lvl8pPr marL="2971557" indent="0">
               <a:buNone/>
-              <a:defRPr sz="1400">
+              <a:defRPr sz="1300">
                 <a:solidFill>
                   <a:schemeClr val="tx1">
                     <a:tint val="75000"/>
@@ -1454,9 +1461,9 @@
                 </a:solidFill>
               </a:defRPr>
             </a:lvl8pPr>
-            <a:lvl9pPr marL="3657600" indent="0">
+            <a:lvl9pPr marL="3396065" indent="0">
               <a:buNone/>
-              <a:defRPr sz="1400">
+              <a:defRPr sz="1300">
                 <a:solidFill>
                   <a:schemeClr val="tx1">
                     <a:tint val="75000"/>
@@ -1491,7 +1498,7 @@
           <a:p>
             <a:fld id="{E1D2620B-6619-314E-A368-62BBC874E253}" type="datetimeFigureOut">
               <a:rPr lang="en-US" smtClean="0"/>
-              <a:t>22/03/14</a:t>
+              <a:t>23/03/14</a:t>
             </a:fld>
             <a:endParaRPr lang="en-US" dirty="0"/>
           </a:p>
@@ -1604,39 +1611,39 @@
         </p:nvSpPr>
         <p:spPr>
           <a:xfrm>
-            <a:off x="457200" y="1600200"/>
-            <a:ext cx="4038600" cy="4525963"/>
+            <a:off x="457200" y="1333501"/>
+            <a:ext cx="4038600" cy="3771636"/>
           </a:xfrm>
         </p:spPr>
         <p:txBody>
           <a:bodyPr/>
           <a:lstStyle>
             <a:lvl1pPr>
-              <a:defRPr sz="2800"/>
+              <a:defRPr sz="2600"/>
             </a:lvl1pPr>
             <a:lvl2pPr>
-              <a:defRPr sz="2400"/>
+              <a:defRPr sz="2300"/>
             </a:lvl2pPr>
             <a:lvl3pPr>
-              <a:defRPr sz="2000"/>
+              <a:defRPr sz="1900"/>
             </a:lvl3pPr>
             <a:lvl4pPr>
-              <a:defRPr sz="1800"/>
+              <a:defRPr sz="1700"/>
             </a:lvl4pPr>
             <a:lvl5pPr>
-              <a:defRPr sz="1800"/>
+              <a:defRPr sz="1700"/>
             </a:lvl5pPr>
             <a:lvl6pPr>
-              <a:defRPr sz="1800"/>
+              <a:defRPr sz="1700"/>
             </a:lvl6pPr>
             <a:lvl7pPr>
-              <a:defRPr sz="1800"/>
+              <a:defRPr sz="1700"/>
             </a:lvl7pPr>
             <a:lvl8pPr>
-              <a:defRPr sz="1800"/>
+              <a:defRPr sz="1700"/>
             </a:lvl8pPr>
             <a:lvl9pPr>
-              <a:defRPr sz="1800"/>
+              <a:defRPr sz="1700"/>
             </a:lvl9pPr>
           </a:lstStyle>
           <a:p>
@@ -1689,39 +1696,39 @@
         </p:nvSpPr>
         <p:spPr>
           <a:xfrm>
-            <a:off x="4648200" y="1600200"/>
-            <a:ext cx="4038600" cy="4525963"/>
+            <a:off x="4648200" y="1333501"/>
+            <a:ext cx="4038600" cy="3771636"/>
           </a:xfrm>
         </p:spPr>
         <p:txBody>
           <a:bodyPr/>
           <a:lstStyle>
             <a:lvl1pPr>
-              <a:defRPr sz="2800"/>
+              <a:defRPr sz="2600"/>
             </a:lvl1pPr>
             <a:lvl2pPr>
-              <a:defRPr sz="2400"/>
+              <a:defRPr sz="2300"/>
             </a:lvl2pPr>
             <a:lvl3pPr>
-              <a:defRPr sz="2000"/>
+              <a:defRPr sz="1900"/>
             </a:lvl3pPr>
             <a:lvl4pPr>
-              <a:defRPr sz="1800"/>
+              <a:defRPr sz="1700"/>
             </a:lvl4pPr>
             <a:lvl5pPr>
-              <a:defRPr sz="1800"/>
+              <a:defRPr sz="1700"/>
             </a:lvl5pPr>
             <a:lvl6pPr>
-              <a:defRPr sz="1800"/>
+              <a:defRPr sz="1700"/>
             </a:lvl6pPr>
             <a:lvl7pPr>
-              <a:defRPr sz="1800"/>
+              <a:defRPr sz="1700"/>
             </a:lvl7pPr>
             <a:lvl8pPr>
-              <a:defRPr sz="1800"/>
+              <a:defRPr sz="1700"/>
             </a:lvl8pPr>
             <a:lvl9pPr>
-              <a:defRPr sz="1800"/>
+              <a:defRPr sz="1700"/>
             </a:lvl9pPr>
           </a:lstStyle>
           <a:p>
@@ -1779,7 +1786,7 @@
           <a:p>
             <a:fld id="{E1D2620B-6619-314E-A368-62BBC874E253}" type="datetimeFigureOut">
               <a:rPr lang="en-US" smtClean="0"/>
-              <a:t>22/03/14</a:t>
+              <a:t>23/03/14</a:t>
             </a:fld>
             <a:endParaRPr lang="en-US" dirty="0"/>
           </a:p>
@@ -1896,8 +1903,8 @@
         </p:nvSpPr>
         <p:spPr>
           <a:xfrm>
-            <a:off x="457200" y="1535113"/>
-            <a:ext cx="4040188" cy="639762"/>
+            <a:off x="457200" y="1279261"/>
+            <a:ext cx="4040188" cy="533135"/>
           </a:xfrm>
         </p:spPr>
         <p:txBody>
@@ -1905,39 +1912,39 @@
           <a:lstStyle>
             <a:lvl1pPr marL="0" indent="0">
               <a:buNone/>
-              <a:defRPr sz="2400" b="1"/>
+              <a:defRPr sz="2300" b="1"/>
             </a:lvl1pPr>
-            <a:lvl2pPr marL="457200" indent="0">
+            <a:lvl2pPr marL="424508" indent="0">
               <a:buNone/>
-              <a:defRPr sz="2000" b="1"/>
+              <a:defRPr sz="1900" b="1"/>
             </a:lvl2pPr>
-            <a:lvl3pPr marL="914400" indent="0">
+            <a:lvl3pPr marL="849017" indent="0">
               <a:buNone/>
-              <a:defRPr sz="1800" b="1"/>
+              <a:defRPr sz="1700" b="1"/>
             </a:lvl3pPr>
-            <a:lvl4pPr marL="1371600" indent="0">
+            <a:lvl4pPr marL="1273525" indent="0">
               <a:buNone/>
-              <a:defRPr sz="1600" b="1"/>
+              <a:defRPr sz="1400" b="1"/>
             </a:lvl4pPr>
-            <a:lvl5pPr marL="1828800" indent="0">
+            <a:lvl5pPr marL="1698033" indent="0">
               <a:buNone/>
-              <a:defRPr sz="1600" b="1"/>
+              <a:defRPr sz="1400" b="1"/>
             </a:lvl5pPr>
-            <a:lvl6pPr marL="2286000" indent="0">
+            <a:lvl6pPr marL="2122541" indent="0">
               <a:buNone/>
-              <a:defRPr sz="1600" b="1"/>
+              <a:defRPr sz="1400" b="1"/>
             </a:lvl6pPr>
-            <a:lvl7pPr marL="2743200" indent="0">
+            <a:lvl7pPr marL="2547049" indent="0">
               <a:buNone/>
-              <a:defRPr sz="1600" b="1"/>
+              <a:defRPr sz="1400" b="1"/>
             </a:lvl7pPr>
-            <a:lvl8pPr marL="3200400" indent="0">
+            <a:lvl8pPr marL="2971557" indent="0">
               <a:buNone/>
-              <a:defRPr sz="1600" b="1"/>
+              <a:defRPr sz="1400" b="1"/>
             </a:lvl8pPr>
-            <a:lvl9pPr marL="3657600" indent="0">
+            <a:lvl9pPr marL="3396065" indent="0">
               <a:buNone/>
-              <a:defRPr sz="1600" b="1"/>
+              <a:defRPr sz="1400" b="1"/>
             </a:lvl9pPr>
           </a:lstStyle>
           <a:p>
@@ -1961,39 +1968,39 @@
         </p:nvSpPr>
         <p:spPr>
           <a:xfrm>
-            <a:off x="457200" y="2174875"/>
-            <a:ext cx="4040188" cy="3951288"/>
+            <a:off x="457200" y="1812396"/>
+            <a:ext cx="4040188" cy="3292740"/>
           </a:xfrm>
         </p:spPr>
         <p:txBody>
           <a:bodyPr/>
           <a:lstStyle>
             <a:lvl1pPr>
-              <a:defRPr sz="2400"/>
+              <a:defRPr sz="2300"/>
             </a:lvl1pPr>
             <a:lvl2pPr>
-              <a:defRPr sz="2000"/>
+              <a:defRPr sz="1900"/>
             </a:lvl2pPr>
             <a:lvl3pPr>
-              <a:defRPr sz="1800"/>
+              <a:defRPr sz="1700"/>
             </a:lvl3pPr>
             <a:lvl4pPr>
-              <a:defRPr sz="1600"/>
+              <a:defRPr sz="1400"/>
             </a:lvl4pPr>
             <a:lvl5pPr>
-              <a:defRPr sz="1600"/>
+              <a:defRPr sz="1400"/>
             </a:lvl5pPr>
             <a:lvl6pPr>
-              <a:defRPr sz="1600"/>
+              <a:defRPr sz="1400"/>
             </a:lvl6pPr>
             <a:lvl7pPr>
-              <a:defRPr sz="1600"/>
+              <a:defRPr sz="1400"/>
             </a:lvl7pPr>
             <a:lvl8pPr>
-              <a:defRPr sz="1600"/>
+              <a:defRPr sz="1400"/>
             </a:lvl8pPr>
             <a:lvl9pPr>
-              <a:defRPr sz="1600"/>
+              <a:defRPr sz="1400"/>
             </a:lvl9pPr>
           </a:lstStyle>
           <a:p>
@@ -2046,8 +2053,8 @@
         </p:nvSpPr>
         <p:spPr>
           <a:xfrm>
-            <a:off x="4645025" y="1535113"/>
-            <a:ext cx="4041775" cy="639762"/>
+            <a:off x="4645026" y="1279261"/>
+            <a:ext cx="4041775" cy="533135"/>
           </a:xfrm>
         </p:spPr>
         <p:txBody>
@@ -2055,39 +2062,39 @@
           <a:lstStyle>
             <a:lvl1pPr marL="0" indent="0">
               <a:buNone/>
-              <a:defRPr sz="2400" b="1"/>
+              <a:defRPr sz="2300" b="1"/>
             </a:lvl1pPr>
-            <a:lvl2pPr marL="457200" indent="0">
+            <a:lvl2pPr marL="424508" indent="0">
               <a:buNone/>
-              <a:defRPr sz="2000" b="1"/>
+              <a:defRPr sz="1900" b="1"/>
             </a:lvl2pPr>
-            <a:lvl3pPr marL="914400" indent="0">
+            <a:lvl3pPr marL="849017" indent="0">
               <a:buNone/>
-              <a:defRPr sz="1800" b="1"/>
+              <a:defRPr sz="1700" b="1"/>
             </a:lvl3pPr>
-            <a:lvl4pPr marL="1371600" indent="0">
+            <a:lvl4pPr marL="1273525" indent="0">
               <a:buNone/>
-              <a:defRPr sz="1600" b="1"/>
+              <a:defRPr sz="1400" b="1"/>
             </a:lvl4pPr>
-            <a:lvl5pPr marL="1828800" indent="0">
+            <a:lvl5pPr marL="1698033" indent="0">
               <a:buNone/>
-              <a:defRPr sz="1600" b="1"/>
+              <a:defRPr sz="1400" b="1"/>
             </a:lvl5pPr>
-            <a:lvl6pPr marL="2286000" indent="0">
+            <a:lvl6pPr marL="2122541" indent="0">
               <a:buNone/>
-              <a:defRPr sz="1600" b="1"/>
+              <a:defRPr sz="1400" b="1"/>
             </a:lvl6pPr>
-            <a:lvl7pPr marL="2743200" indent="0">
+            <a:lvl7pPr marL="2547049" indent="0">
               <a:buNone/>
-              <a:defRPr sz="1600" b="1"/>
+              <a:defRPr sz="1400" b="1"/>
             </a:lvl7pPr>
-            <a:lvl8pPr marL="3200400" indent="0">
+            <a:lvl8pPr marL="2971557" indent="0">
               <a:buNone/>
-              <a:defRPr sz="1600" b="1"/>
+              <a:defRPr sz="1400" b="1"/>
             </a:lvl8pPr>
-            <a:lvl9pPr marL="3657600" indent="0">
+            <a:lvl9pPr marL="3396065" indent="0">
               <a:buNone/>
-              <a:defRPr sz="1600" b="1"/>
+              <a:defRPr sz="1400" b="1"/>
             </a:lvl9pPr>
           </a:lstStyle>
           <a:p>
@@ -2111,39 +2118,39 @@
         </p:nvSpPr>
         <p:spPr>
           <a:xfrm>
-            <a:off x="4645025" y="2174875"/>
-            <a:ext cx="4041775" cy="3951288"/>
+            <a:off x="4645026" y="1812396"/>
+            <a:ext cx="4041775" cy="3292740"/>
           </a:xfrm>
         </p:spPr>
         <p:txBody>
           <a:bodyPr/>
           <a:lstStyle>
             <a:lvl1pPr>
-              <a:defRPr sz="2400"/>
+              <a:defRPr sz="2300"/>
             </a:lvl1pPr>
             <a:lvl2pPr>
-              <a:defRPr sz="2000"/>
+              <a:defRPr sz="1900"/>
             </a:lvl2pPr>
             <a:lvl3pPr>
-              <a:defRPr sz="1800"/>
+              <a:defRPr sz="1700"/>
             </a:lvl3pPr>
             <a:lvl4pPr>
-              <a:defRPr sz="1600"/>
+              <a:defRPr sz="1400"/>
             </a:lvl4pPr>
             <a:lvl5pPr>
-              <a:defRPr sz="1600"/>
+              <a:defRPr sz="1400"/>
             </a:lvl5pPr>
             <a:lvl6pPr>
-              <a:defRPr sz="1600"/>
+              <a:defRPr sz="1400"/>
             </a:lvl6pPr>
             <a:lvl7pPr>
-              <a:defRPr sz="1600"/>
+              <a:defRPr sz="1400"/>
             </a:lvl7pPr>
             <a:lvl8pPr>
-              <a:defRPr sz="1600"/>
+              <a:defRPr sz="1400"/>
             </a:lvl8pPr>
             <a:lvl9pPr>
-              <a:defRPr sz="1600"/>
+              <a:defRPr sz="1400"/>
             </a:lvl9pPr>
           </a:lstStyle>
           <a:p>
@@ -2201,7 +2208,7 @@
           <a:p>
             <a:fld id="{E1D2620B-6619-314E-A368-62BBC874E253}" type="datetimeFigureOut">
               <a:rPr lang="en-US" smtClean="0"/>
-              <a:t>22/03/14</a:t>
+              <a:t>23/03/14</a:t>
             </a:fld>
             <a:endParaRPr lang="en-US" dirty="0"/>
           </a:p>
@@ -2319,7 +2326,7 @@
           <a:p>
             <a:fld id="{E1D2620B-6619-314E-A368-62BBC874E253}" type="datetimeFigureOut">
               <a:rPr lang="en-US" smtClean="0"/>
-              <a:t>22/03/14</a:t>
+              <a:t>23/03/14</a:t>
             </a:fld>
             <a:endParaRPr lang="en-US" dirty="0"/>
           </a:p>
@@ -2414,7 +2421,7 @@
           <a:p>
             <a:fld id="{E1D2620B-6619-314E-A368-62BBC874E253}" type="datetimeFigureOut">
               <a:rPr lang="en-US" smtClean="0"/>
-              <a:t>22/03/14</a:t>
+              <a:t>23/03/14</a:t>
             </a:fld>
             <a:endParaRPr lang="en-US" dirty="0"/>
           </a:p>
@@ -2504,15 +2511,15 @@
         </p:nvSpPr>
         <p:spPr>
           <a:xfrm>
-            <a:off x="457200" y="273050"/>
-            <a:ext cx="3008313" cy="1162050"/>
+            <a:off x="457201" y="227542"/>
+            <a:ext cx="3008313" cy="968375"/>
           </a:xfrm>
         </p:spPr>
         <p:txBody>
           <a:bodyPr anchor="b"/>
           <a:lstStyle>
             <a:lvl1pPr algn="l">
-              <a:defRPr sz="2000" b="1"/>
+              <a:defRPr sz="1900" b="1"/>
             </a:lvl1pPr>
           </a:lstStyle>
           <a:p>
@@ -2536,39 +2543,39 @@
         </p:nvSpPr>
         <p:spPr>
           <a:xfrm>
-            <a:off x="3575050" y="273050"/>
-            <a:ext cx="5111750" cy="5853113"/>
+            <a:off x="3575050" y="227542"/>
+            <a:ext cx="5111750" cy="4877594"/>
           </a:xfrm>
         </p:spPr>
         <p:txBody>
           <a:bodyPr/>
           <a:lstStyle>
             <a:lvl1pPr>
-              <a:defRPr sz="3200"/>
+              <a:defRPr sz="3000"/>
             </a:lvl1pPr>
             <a:lvl2pPr>
-              <a:defRPr sz="2800"/>
+              <a:defRPr sz="2600"/>
             </a:lvl2pPr>
             <a:lvl3pPr>
-              <a:defRPr sz="2400"/>
+              <a:defRPr sz="2300"/>
             </a:lvl3pPr>
             <a:lvl4pPr>
-              <a:defRPr sz="2000"/>
+              <a:defRPr sz="1900"/>
             </a:lvl4pPr>
             <a:lvl5pPr>
-              <a:defRPr sz="2000"/>
+              <a:defRPr sz="1900"/>
             </a:lvl5pPr>
             <a:lvl6pPr>
-              <a:defRPr sz="2000"/>
+              <a:defRPr sz="1900"/>
             </a:lvl6pPr>
             <a:lvl7pPr>
-              <a:defRPr sz="2000"/>
+              <a:defRPr sz="1900"/>
             </a:lvl7pPr>
             <a:lvl8pPr>
-              <a:defRPr sz="2000"/>
+              <a:defRPr sz="1900"/>
             </a:lvl8pPr>
             <a:lvl9pPr>
-              <a:defRPr sz="2000"/>
+              <a:defRPr sz="1900"/>
             </a:lvl9pPr>
           </a:lstStyle>
           <a:p>
@@ -2621,8 +2628,8 @@
         </p:nvSpPr>
         <p:spPr>
           <a:xfrm>
-            <a:off x="457200" y="1435100"/>
-            <a:ext cx="3008313" cy="4691063"/>
+            <a:off x="457201" y="1195917"/>
+            <a:ext cx="3008313" cy="3909219"/>
           </a:xfrm>
         </p:spPr>
         <p:txBody>
@@ -2630,37 +2637,37 @@
           <a:lstStyle>
             <a:lvl1pPr marL="0" indent="0">
               <a:buNone/>
-              <a:defRPr sz="1400"/>
+              <a:defRPr sz="1300"/>
             </a:lvl1pPr>
-            <a:lvl2pPr marL="457200" indent="0">
+            <a:lvl2pPr marL="424508" indent="0">
               <a:buNone/>
-              <a:defRPr sz="1200"/>
+              <a:defRPr sz="1100"/>
             </a:lvl2pPr>
-            <a:lvl3pPr marL="914400" indent="0">
+            <a:lvl3pPr marL="849017" indent="0">
               <a:buNone/>
-              <a:defRPr sz="1000"/>
+              <a:defRPr sz="900"/>
             </a:lvl3pPr>
-            <a:lvl4pPr marL="1371600" indent="0">
+            <a:lvl4pPr marL="1273525" indent="0">
               <a:buNone/>
               <a:defRPr sz="900"/>
             </a:lvl4pPr>
-            <a:lvl5pPr marL="1828800" indent="0">
+            <a:lvl5pPr marL="1698033" indent="0">
               <a:buNone/>
               <a:defRPr sz="900"/>
             </a:lvl5pPr>
-            <a:lvl6pPr marL="2286000" indent="0">
+            <a:lvl6pPr marL="2122541" indent="0">
               <a:buNone/>
               <a:defRPr sz="900"/>
             </a:lvl6pPr>
-            <a:lvl7pPr marL="2743200" indent="0">
+            <a:lvl7pPr marL="2547049" indent="0">
               <a:buNone/>
               <a:defRPr sz="900"/>
             </a:lvl7pPr>
-            <a:lvl8pPr marL="3200400" indent="0">
+            <a:lvl8pPr marL="2971557" indent="0">
               <a:buNone/>
               <a:defRPr sz="900"/>
             </a:lvl8pPr>
-            <a:lvl9pPr marL="3657600" indent="0">
+            <a:lvl9pPr marL="3396065" indent="0">
               <a:buNone/>
               <a:defRPr sz="900"/>
             </a:lvl9pPr>
@@ -2691,7 +2698,7 @@
           <a:p>
             <a:fld id="{E1D2620B-6619-314E-A368-62BBC874E253}" type="datetimeFigureOut">
               <a:rPr lang="en-US" smtClean="0"/>
-              <a:t>22/03/14</a:t>
+              <a:t>23/03/14</a:t>
             </a:fld>
             <a:endParaRPr lang="en-US" dirty="0"/>
           </a:p>
@@ -2781,15 +2788,15 @@
         </p:nvSpPr>
         <p:spPr>
           <a:xfrm>
-            <a:off x="1792288" y="4800600"/>
-            <a:ext cx="5486400" cy="566738"/>
+            <a:off x="1792288" y="4000500"/>
+            <a:ext cx="5486400" cy="472282"/>
           </a:xfrm>
         </p:spPr>
         <p:txBody>
           <a:bodyPr anchor="b"/>
           <a:lstStyle>
             <a:lvl1pPr algn="l">
-              <a:defRPr sz="2000" b="1"/>
+              <a:defRPr sz="1900" b="1"/>
             </a:lvl1pPr>
           </a:lstStyle>
           <a:p>
@@ -2813,8 +2820,8 @@
         </p:nvSpPr>
         <p:spPr>
           <a:xfrm>
-            <a:off x="1792288" y="612775"/>
-            <a:ext cx="5486400" cy="4114800"/>
+            <a:off x="1792288" y="510646"/>
+            <a:ext cx="5486400" cy="3429000"/>
           </a:xfrm>
         </p:spPr>
         <p:txBody>
@@ -2822,39 +2829,39 @@
           <a:lstStyle>
             <a:lvl1pPr marL="0" indent="0">
               <a:buNone/>
-              <a:defRPr sz="3200"/>
+              <a:defRPr sz="3000"/>
             </a:lvl1pPr>
-            <a:lvl2pPr marL="457200" indent="0">
+            <a:lvl2pPr marL="424508" indent="0">
               <a:buNone/>
-              <a:defRPr sz="2800"/>
+              <a:defRPr sz="2600"/>
             </a:lvl2pPr>
-            <a:lvl3pPr marL="914400" indent="0">
+            <a:lvl3pPr marL="849017" indent="0">
               <a:buNone/>
-              <a:defRPr sz="2400"/>
+              <a:defRPr sz="2300"/>
             </a:lvl3pPr>
-            <a:lvl4pPr marL="1371600" indent="0">
+            <a:lvl4pPr marL="1273525" indent="0">
               <a:buNone/>
-              <a:defRPr sz="2000"/>
+              <a:defRPr sz="1900"/>
             </a:lvl4pPr>
-            <a:lvl5pPr marL="1828800" indent="0">
+            <a:lvl5pPr marL="1698033" indent="0">
               <a:buNone/>
-              <a:defRPr sz="2000"/>
+              <a:defRPr sz="1900"/>
             </a:lvl5pPr>
-            <a:lvl6pPr marL="2286000" indent="0">
+            <a:lvl6pPr marL="2122541" indent="0">
               <a:buNone/>
-              <a:defRPr sz="2000"/>
+              <a:defRPr sz="1900"/>
             </a:lvl6pPr>
-            <a:lvl7pPr marL="2743200" indent="0">
+            <a:lvl7pPr marL="2547049" indent="0">
               <a:buNone/>
-              <a:defRPr sz="2000"/>
+              <a:defRPr sz="1900"/>
             </a:lvl7pPr>
-            <a:lvl8pPr marL="3200400" indent="0">
+            <a:lvl8pPr marL="2971557" indent="0">
               <a:buNone/>
-              <a:defRPr sz="2000"/>
+              <a:defRPr sz="1900"/>
             </a:lvl8pPr>
-            <a:lvl9pPr marL="3657600" indent="0">
+            <a:lvl9pPr marL="3396065" indent="0">
               <a:buNone/>
-              <a:defRPr sz="2000"/>
+              <a:defRPr sz="1900"/>
             </a:lvl9pPr>
           </a:lstStyle>
           <a:p>
@@ -2874,8 +2881,8 @@
         </p:nvSpPr>
         <p:spPr>
           <a:xfrm>
-            <a:off x="1792288" y="5367338"/>
-            <a:ext cx="5486400" cy="804862"/>
+            <a:off x="1792288" y="4472782"/>
+            <a:ext cx="5486400" cy="670718"/>
           </a:xfrm>
         </p:spPr>
         <p:txBody>
@@ -2883,37 +2890,37 @@
           <a:lstStyle>
             <a:lvl1pPr marL="0" indent="0">
               <a:buNone/>
-              <a:defRPr sz="1400"/>
+              <a:defRPr sz="1300"/>
             </a:lvl1pPr>
-            <a:lvl2pPr marL="457200" indent="0">
+            <a:lvl2pPr marL="424508" indent="0">
               <a:buNone/>
-              <a:defRPr sz="1200"/>
+              <a:defRPr sz="1100"/>
             </a:lvl2pPr>
-            <a:lvl3pPr marL="914400" indent="0">
+            <a:lvl3pPr marL="849017" indent="0">
               <a:buNone/>
-              <a:defRPr sz="1000"/>
+              <a:defRPr sz="900"/>
             </a:lvl3pPr>
-            <a:lvl4pPr marL="1371600" indent="0">
+            <a:lvl4pPr marL="1273525" indent="0">
               <a:buNone/>
               <a:defRPr sz="900"/>
             </a:lvl4pPr>
-            <a:lvl5pPr marL="1828800" indent="0">
+            <a:lvl5pPr marL="1698033" indent="0">
               <a:buNone/>
               <a:defRPr sz="900"/>
             </a:lvl5pPr>
-            <a:lvl6pPr marL="2286000" indent="0">
+            <a:lvl6pPr marL="2122541" indent="0">
               <a:buNone/>
               <a:defRPr sz="900"/>
             </a:lvl6pPr>
-            <a:lvl7pPr marL="2743200" indent="0">
+            <a:lvl7pPr marL="2547049" indent="0">
               <a:buNone/>
               <a:defRPr sz="900"/>
             </a:lvl7pPr>
-            <a:lvl8pPr marL="3200400" indent="0">
+            <a:lvl8pPr marL="2971557" indent="0">
               <a:buNone/>
               <a:defRPr sz="900"/>
             </a:lvl8pPr>
-            <a:lvl9pPr marL="3657600" indent="0">
+            <a:lvl9pPr marL="3396065" indent="0">
               <a:buNone/>
               <a:defRPr sz="900"/>
             </a:lvl9pPr>
@@ -2944,7 +2951,7 @@
           <a:p>
             <a:fld id="{E1D2620B-6619-314E-A368-62BBC874E253}" type="datetimeFigureOut">
               <a:rPr lang="en-US" smtClean="0"/>
-              <a:t>22/03/14</a:t>
+              <a:t>23/03/14</a:t>
             </a:fld>
             <a:endParaRPr lang="en-US" dirty="0"/>
           </a:p>
@@ -3039,15 +3046,15 @@
         </p:nvSpPr>
         <p:spPr>
           <a:xfrm>
-            <a:off x="457200" y="274638"/>
-            <a:ext cx="8229600" cy="1143000"/>
+            <a:off x="457200" y="228865"/>
+            <a:ext cx="8229600" cy="952500"/>
           </a:xfrm>
           <a:prstGeom prst="rect">
             <a:avLst/>
           </a:prstGeom>
         </p:spPr>
         <p:txBody>
-          <a:bodyPr vert="horz" lIns="91440" tIns="45720" rIns="91440" bIns="45720" rtlCol="0" anchor="ctr">
+          <a:bodyPr vert="horz" lIns="84902" tIns="42451" rIns="84902" bIns="42451" rtlCol="0" anchor="ctr">
             <a:normAutofit/>
           </a:bodyPr>
           <a:lstStyle/>
@@ -3072,15 +3079,15 @@
         </p:nvSpPr>
         <p:spPr>
           <a:xfrm>
-            <a:off x="457200" y="1600200"/>
-            <a:ext cx="8229600" cy="4525963"/>
+            <a:off x="457200" y="1333501"/>
+            <a:ext cx="8229600" cy="3771636"/>
           </a:xfrm>
           <a:prstGeom prst="rect">
             <a:avLst/>
           </a:prstGeom>
         </p:spPr>
         <p:txBody>
-          <a:bodyPr vert="horz" lIns="91440" tIns="45720" rIns="91440" bIns="45720" rtlCol="0">
+          <a:bodyPr vert="horz" lIns="84902" tIns="42451" rIns="84902" bIns="42451" rtlCol="0">
             <a:normAutofit/>
           </a:bodyPr>
           <a:lstStyle/>
@@ -3134,18 +3141,18 @@
         </p:nvSpPr>
         <p:spPr>
           <a:xfrm>
-            <a:off x="457200" y="6356350"/>
-            <a:ext cx="2133600" cy="365125"/>
+            <a:off x="457200" y="5296959"/>
+            <a:ext cx="2133600" cy="304271"/>
           </a:xfrm>
           <a:prstGeom prst="rect">
             <a:avLst/>
           </a:prstGeom>
         </p:spPr>
         <p:txBody>
-          <a:bodyPr vert="horz" lIns="91440" tIns="45720" rIns="91440" bIns="45720" rtlCol="0" anchor="ctr"/>
+          <a:bodyPr vert="horz" lIns="84902" tIns="42451" rIns="84902" bIns="42451" rtlCol="0" anchor="ctr"/>
           <a:lstStyle>
             <a:lvl1pPr algn="l">
-              <a:defRPr sz="1200">
+              <a:defRPr sz="1100">
                 <a:solidFill>
                   <a:schemeClr val="tx1">
                     <a:tint val="75000"/>
@@ -3157,7 +3164,7 @@
           <a:p>
             <a:fld id="{E1D2620B-6619-314E-A368-62BBC874E253}" type="datetimeFigureOut">
               <a:rPr lang="en-US" smtClean="0"/>
-              <a:t>22/03/14</a:t>
+              <a:t>23/03/14</a:t>
             </a:fld>
             <a:endParaRPr lang="en-US" dirty="0"/>
           </a:p>
@@ -3175,18 +3182,18 @@
         </p:nvSpPr>
         <p:spPr>
           <a:xfrm>
-            <a:off x="3124200" y="6356350"/>
-            <a:ext cx="2895600" cy="365125"/>
+            <a:off x="3124200" y="5296959"/>
+            <a:ext cx="2895600" cy="304271"/>
           </a:xfrm>
           <a:prstGeom prst="rect">
             <a:avLst/>
           </a:prstGeom>
         </p:spPr>
         <p:txBody>
-          <a:bodyPr vert="horz" lIns="91440" tIns="45720" rIns="91440" bIns="45720" rtlCol="0" anchor="ctr"/>
+          <a:bodyPr vert="horz" lIns="84902" tIns="42451" rIns="84902" bIns="42451" rtlCol="0" anchor="ctr"/>
           <a:lstStyle>
             <a:lvl1pPr algn="ctr">
-              <a:defRPr sz="1200">
+              <a:defRPr sz="1100">
                 <a:solidFill>
                   <a:schemeClr val="tx1">
                     <a:tint val="75000"/>
@@ -3212,18 +3219,18 @@
         </p:nvSpPr>
         <p:spPr>
           <a:xfrm>
-            <a:off x="6553200" y="6356350"/>
-            <a:ext cx="2133600" cy="365125"/>
+            <a:off x="6553200" y="5296959"/>
+            <a:ext cx="2133600" cy="304271"/>
           </a:xfrm>
           <a:prstGeom prst="rect">
             <a:avLst/>
           </a:prstGeom>
         </p:spPr>
         <p:txBody>
-          <a:bodyPr vert="horz" lIns="91440" tIns="45720" rIns="91440" bIns="45720" rtlCol="0" anchor="ctr"/>
+          <a:bodyPr vert="horz" lIns="84902" tIns="42451" rIns="84902" bIns="42451" rtlCol="0" anchor="ctr"/>
           <a:lstStyle>
             <a:lvl1pPr algn="r">
-              <a:defRPr sz="1200">
+              <a:defRPr sz="1100">
                 <a:solidFill>
                   <a:schemeClr val="tx1">
                     <a:tint val="75000"/>
@@ -3264,12 +3271,12 @@
   </p:sldLayoutIdLst>
   <p:txStyles>
     <p:titleStyle>
-      <a:lvl1pPr algn="ctr" defTabSz="457200" rtl="0" eaLnBrk="1" latinLnBrk="0" hangingPunct="1">
+      <a:lvl1pPr algn="ctr" defTabSz="424508" rtl="0" eaLnBrk="1" latinLnBrk="0" hangingPunct="1">
         <a:spcBef>
           <a:spcPct val="0"/>
         </a:spcBef>
         <a:buNone/>
-        <a:defRPr sz="4400" kern="1200">
+        <a:defRPr sz="4100" kern="1200">
           <a:solidFill>
             <a:schemeClr val="tx1"/>
           </a:solidFill>
@@ -3280,13 +3287,13 @@
       </a:lvl1pPr>
     </p:titleStyle>
     <p:bodyStyle>
-      <a:lvl1pPr marL="342900" indent="-342900" algn="l" defTabSz="457200" rtl="0" eaLnBrk="1" latinLnBrk="0" hangingPunct="1">
+      <a:lvl1pPr marL="318381" indent="-318381" algn="l" defTabSz="424508" rtl="0" eaLnBrk="1" latinLnBrk="0" hangingPunct="1">
         <a:spcBef>
           <a:spcPct val="20000"/>
         </a:spcBef>
         <a:buFont typeface="Arial"/>
         <a:buChar char="•"/>
-        <a:defRPr sz="3200" kern="1200">
+        <a:defRPr sz="3000" kern="1200">
           <a:solidFill>
             <a:schemeClr val="tx1"/>
           </a:solidFill>
@@ -3295,13 +3302,13 @@
           <a:cs typeface="+mn-cs"/>
         </a:defRPr>
       </a:lvl1pPr>
-      <a:lvl2pPr marL="742950" indent="-285750" algn="l" defTabSz="457200" rtl="0" eaLnBrk="1" latinLnBrk="0" hangingPunct="1">
+      <a:lvl2pPr marL="689826" indent="-265317" algn="l" defTabSz="424508" rtl="0" eaLnBrk="1" latinLnBrk="0" hangingPunct="1">
         <a:spcBef>
           <a:spcPct val="20000"/>
         </a:spcBef>
         <a:buFont typeface="Arial"/>
         <a:buChar char="–"/>
-        <a:defRPr sz="2800" kern="1200">
+        <a:defRPr sz="2600" kern="1200">
           <a:solidFill>
             <a:schemeClr val="tx1"/>
           </a:solidFill>
@@ -3310,13 +3317,13 @@
           <a:cs typeface="+mn-cs"/>
         </a:defRPr>
       </a:lvl2pPr>
-      <a:lvl3pPr marL="1143000" indent="-228600" algn="l" defTabSz="457200" rtl="0" eaLnBrk="1" latinLnBrk="0" hangingPunct="1">
+      <a:lvl3pPr marL="1061271" indent="-212254" algn="l" defTabSz="424508" rtl="0" eaLnBrk="1" latinLnBrk="0" hangingPunct="1">
         <a:spcBef>
           <a:spcPct val="20000"/>
         </a:spcBef>
         <a:buFont typeface="Arial"/>
         <a:buChar char="•"/>
-        <a:defRPr sz="2400" kern="1200">
+        <a:defRPr sz="2300" kern="1200">
           <a:solidFill>
             <a:schemeClr val="tx1"/>
           </a:solidFill>
@@ -3325,13 +3332,13 @@
           <a:cs typeface="+mn-cs"/>
         </a:defRPr>
       </a:lvl3pPr>
-      <a:lvl4pPr marL="1600200" indent="-228600" algn="l" defTabSz="457200" rtl="0" eaLnBrk="1" latinLnBrk="0" hangingPunct="1">
+      <a:lvl4pPr marL="1485779" indent="-212254" algn="l" defTabSz="424508" rtl="0" eaLnBrk="1" latinLnBrk="0" hangingPunct="1">
         <a:spcBef>
           <a:spcPct val="20000"/>
         </a:spcBef>
         <a:buFont typeface="Arial"/>
         <a:buChar char="–"/>
-        <a:defRPr sz="2000" kern="1200">
+        <a:defRPr sz="1900" kern="1200">
           <a:solidFill>
             <a:schemeClr val="tx1"/>
           </a:solidFill>
@@ -3340,13 +3347,13 @@
           <a:cs typeface="+mn-cs"/>
         </a:defRPr>
       </a:lvl4pPr>
-      <a:lvl5pPr marL="2057400" indent="-228600" algn="l" defTabSz="457200" rtl="0" eaLnBrk="1" latinLnBrk="0" hangingPunct="1">
+      <a:lvl5pPr marL="1910287" indent="-212254" algn="l" defTabSz="424508" rtl="0" eaLnBrk="1" latinLnBrk="0" hangingPunct="1">
         <a:spcBef>
           <a:spcPct val="20000"/>
         </a:spcBef>
         <a:buFont typeface="Arial"/>
         <a:buChar char="»"/>
-        <a:defRPr sz="2000" kern="1200">
+        <a:defRPr sz="1900" kern="1200">
           <a:solidFill>
             <a:schemeClr val="tx1"/>
           </a:solidFill>
@@ -3355,13 +3362,13 @@
           <a:cs typeface="+mn-cs"/>
         </a:defRPr>
       </a:lvl5pPr>
-      <a:lvl6pPr marL="2514600" indent="-228600" algn="l" defTabSz="457200" rtl="0" eaLnBrk="1" latinLnBrk="0" hangingPunct="1">
+      <a:lvl6pPr marL="2334795" indent="-212254" algn="l" defTabSz="424508" rtl="0" eaLnBrk="1" latinLnBrk="0" hangingPunct="1">
         <a:spcBef>
           <a:spcPct val="20000"/>
         </a:spcBef>
         <a:buFont typeface="Arial"/>
         <a:buChar char="•"/>
-        <a:defRPr sz="2000" kern="1200">
+        <a:defRPr sz="1900" kern="1200">
           <a:solidFill>
             <a:schemeClr val="tx1"/>
           </a:solidFill>
@@ -3370,13 +3377,13 @@
           <a:cs typeface="+mn-cs"/>
         </a:defRPr>
       </a:lvl6pPr>
-      <a:lvl7pPr marL="2971800" indent="-228600" algn="l" defTabSz="457200" rtl="0" eaLnBrk="1" latinLnBrk="0" hangingPunct="1">
+      <a:lvl7pPr marL="2759303" indent="-212254" algn="l" defTabSz="424508" rtl="0" eaLnBrk="1" latinLnBrk="0" hangingPunct="1">
         <a:spcBef>
           <a:spcPct val="20000"/>
         </a:spcBef>
         <a:buFont typeface="Arial"/>
         <a:buChar char="•"/>
-        <a:defRPr sz="2000" kern="1200">
+        <a:defRPr sz="1900" kern="1200">
           <a:solidFill>
             <a:schemeClr val="tx1"/>
           </a:solidFill>
@@ -3385,13 +3392,13 @@
           <a:cs typeface="+mn-cs"/>
         </a:defRPr>
       </a:lvl7pPr>
-      <a:lvl8pPr marL="3429000" indent="-228600" algn="l" defTabSz="457200" rtl="0" eaLnBrk="1" latinLnBrk="0" hangingPunct="1">
+      <a:lvl8pPr marL="3183811" indent="-212254" algn="l" defTabSz="424508" rtl="0" eaLnBrk="1" latinLnBrk="0" hangingPunct="1">
         <a:spcBef>
           <a:spcPct val="20000"/>
         </a:spcBef>
         <a:buFont typeface="Arial"/>
         <a:buChar char="•"/>
-        <a:defRPr sz="2000" kern="1200">
+        <a:defRPr sz="1900" kern="1200">
           <a:solidFill>
             <a:schemeClr val="tx1"/>
           </a:solidFill>
@@ -3400,13 +3407,13 @@
           <a:cs typeface="+mn-cs"/>
         </a:defRPr>
       </a:lvl8pPr>
-      <a:lvl9pPr marL="3886200" indent="-228600" algn="l" defTabSz="457200" rtl="0" eaLnBrk="1" latinLnBrk="0" hangingPunct="1">
+      <a:lvl9pPr marL="3608320" indent="-212254" algn="l" defTabSz="424508" rtl="0" eaLnBrk="1" latinLnBrk="0" hangingPunct="1">
         <a:spcBef>
           <a:spcPct val="20000"/>
         </a:spcBef>
         <a:buFont typeface="Arial"/>
         <a:buChar char="•"/>
-        <a:defRPr sz="2000" kern="1200">
+        <a:defRPr sz="1900" kern="1200">
           <a:solidFill>
             <a:schemeClr val="tx1"/>
           </a:solidFill>
@@ -3420,8 +3427,8 @@
       <a:defPPr>
         <a:defRPr lang="en-US"/>
       </a:defPPr>
-      <a:lvl1pPr marL="0" algn="l" defTabSz="457200" rtl="0" eaLnBrk="1" latinLnBrk="0" hangingPunct="1">
-        <a:defRPr sz="1800" kern="1200">
+      <a:lvl1pPr marL="0" algn="l" defTabSz="424508" rtl="0" eaLnBrk="1" latinLnBrk="0" hangingPunct="1">
+        <a:defRPr sz="1700" kern="1200">
           <a:solidFill>
             <a:schemeClr val="tx1"/>
           </a:solidFill>
@@ -3430,8 +3437,8 @@
           <a:cs typeface="+mn-cs"/>
         </a:defRPr>
       </a:lvl1pPr>
-      <a:lvl2pPr marL="457200" algn="l" defTabSz="457200" rtl="0" eaLnBrk="1" latinLnBrk="0" hangingPunct="1">
-        <a:defRPr sz="1800" kern="1200">
+      <a:lvl2pPr marL="424508" algn="l" defTabSz="424508" rtl="0" eaLnBrk="1" latinLnBrk="0" hangingPunct="1">
+        <a:defRPr sz="1700" kern="1200">
           <a:solidFill>
             <a:schemeClr val="tx1"/>
           </a:solidFill>
@@ -3440,8 +3447,8 @@
           <a:cs typeface="+mn-cs"/>
         </a:defRPr>
       </a:lvl2pPr>
-      <a:lvl3pPr marL="914400" algn="l" defTabSz="457200" rtl="0" eaLnBrk="1" latinLnBrk="0" hangingPunct="1">
-        <a:defRPr sz="1800" kern="1200">
+      <a:lvl3pPr marL="849017" algn="l" defTabSz="424508" rtl="0" eaLnBrk="1" latinLnBrk="0" hangingPunct="1">
+        <a:defRPr sz="1700" kern="1200">
           <a:solidFill>
             <a:schemeClr val="tx1"/>
           </a:solidFill>
@@ -3450,8 +3457,8 @@
           <a:cs typeface="+mn-cs"/>
         </a:defRPr>
       </a:lvl3pPr>
-      <a:lvl4pPr marL="1371600" algn="l" defTabSz="457200" rtl="0" eaLnBrk="1" latinLnBrk="0" hangingPunct="1">
-        <a:defRPr sz="1800" kern="1200">
+      <a:lvl4pPr marL="1273525" algn="l" defTabSz="424508" rtl="0" eaLnBrk="1" latinLnBrk="0" hangingPunct="1">
+        <a:defRPr sz="1700" kern="1200">
           <a:solidFill>
             <a:schemeClr val="tx1"/>
           </a:solidFill>
@@ -3460,8 +3467,8 @@
           <a:cs typeface="+mn-cs"/>
         </a:defRPr>
       </a:lvl4pPr>
-      <a:lvl5pPr marL="1828800" algn="l" defTabSz="457200" rtl="0" eaLnBrk="1" latinLnBrk="0" hangingPunct="1">
-        <a:defRPr sz="1800" kern="1200">
+      <a:lvl5pPr marL="1698033" algn="l" defTabSz="424508" rtl="0" eaLnBrk="1" latinLnBrk="0" hangingPunct="1">
+        <a:defRPr sz="1700" kern="1200">
           <a:solidFill>
             <a:schemeClr val="tx1"/>
           </a:solidFill>
@@ -3470,8 +3477,8 @@
           <a:cs typeface="+mn-cs"/>
         </a:defRPr>
       </a:lvl5pPr>
-      <a:lvl6pPr marL="2286000" algn="l" defTabSz="457200" rtl="0" eaLnBrk="1" latinLnBrk="0" hangingPunct="1">
-        <a:defRPr sz="1800" kern="1200">
+      <a:lvl6pPr marL="2122541" algn="l" defTabSz="424508" rtl="0" eaLnBrk="1" latinLnBrk="0" hangingPunct="1">
+        <a:defRPr sz="1700" kern="1200">
           <a:solidFill>
             <a:schemeClr val="tx1"/>
           </a:solidFill>
@@ -3480,8 +3487,8 @@
           <a:cs typeface="+mn-cs"/>
         </a:defRPr>
       </a:lvl6pPr>
-      <a:lvl7pPr marL="2743200" algn="l" defTabSz="457200" rtl="0" eaLnBrk="1" latinLnBrk="0" hangingPunct="1">
-        <a:defRPr sz="1800" kern="1200">
+      <a:lvl7pPr marL="2547049" algn="l" defTabSz="424508" rtl="0" eaLnBrk="1" latinLnBrk="0" hangingPunct="1">
+        <a:defRPr sz="1700" kern="1200">
           <a:solidFill>
             <a:schemeClr val="tx1"/>
           </a:solidFill>
@@ -3490,8 +3497,8 @@
           <a:cs typeface="+mn-cs"/>
         </a:defRPr>
       </a:lvl7pPr>
-      <a:lvl8pPr marL="3200400" algn="l" defTabSz="457200" rtl="0" eaLnBrk="1" latinLnBrk="0" hangingPunct="1">
-        <a:defRPr sz="1800" kern="1200">
+      <a:lvl8pPr marL="2971557" algn="l" defTabSz="424508" rtl="0" eaLnBrk="1" latinLnBrk="0" hangingPunct="1">
+        <a:defRPr sz="1700" kern="1200">
           <a:solidFill>
             <a:schemeClr val="tx1"/>
           </a:solidFill>
@@ -3500,8 +3507,8 @@
           <a:cs typeface="+mn-cs"/>
         </a:defRPr>
       </a:lvl8pPr>
-      <a:lvl9pPr marL="3657600" algn="l" defTabSz="457200" rtl="0" eaLnBrk="1" latinLnBrk="0" hangingPunct="1">
-        <a:defRPr sz="1800" kern="1200">
+      <a:lvl9pPr marL="3396065" algn="l" defTabSz="424508" rtl="0" eaLnBrk="1" latinLnBrk="0" hangingPunct="1">
+        <a:defRPr sz="1700" kern="1200">
           <a:solidFill>
             <a:schemeClr val="tx1"/>
           </a:solidFill>
@@ -3540,8 +3547,8 @@
         </p:nvSpPr>
         <p:spPr>
           <a:xfrm>
-            <a:off x="580946" y="452967"/>
-            <a:ext cx="2740104" cy="4033873"/>
+            <a:off x="580946" y="377473"/>
+            <a:ext cx="2740104" cy="3361561"/>
           </a:xfrm>
           <a:prstGeom prst="roundRect">
             <a:avLst/>
@@ -3562,7 +3569,7 @@
           </a:fontRef>
         </p:style>
         <p:txBody>
-          <a:bodyPr rtlCol="0" anchor="ctr"/>
+          <a:bodyPr lIns="84902" tIns="42451" rIns="84902" bIns="42451" rtlCol="0" anchor="ctr"/>
           <a:lstStyle/>
           <a:p>
             <a:pPr algn="ctr"/>
@@ -3578,7 +3585,7 @@
         </p:nvCxnSpPr>
         <p:spPr>
           <a:xfrm>
-            <a:off x="584201" y="910167"/>
+            <a:off x="584202" y="758473"/>
             <a:ext cx="2736849" cy="0"/>
           </a:xfrm>
           <a:prstGeom prst="line">
@@ -3609,8 +3616,8 @@
         </p:nvSpPr>
         <p:spPr>
           <a:xfrm>
-            <a:off x="580946" y="452967"/>
-            <a:ext cx="2740104" cy="457200"/>
+            <a:off x="580946" y="377473"/>
+            <a:ext cx="2740104" cy="381000"/>
           </a:xfrm>
           <a:prstGeom prst="rect">
             <a:avLst/>
@@ -3635,7 +3642,7 @@
           </a:fontRef>
         </p:style>
         <p:txBody>
-          <a:bodyPr rtlCol="0" anchor="ctr"/>
+          <a:bodyPr lIns="84902" tIns="42451" rIns="84902" bIns="42451" rtlCol="0" anchor="ctr"/>
           <a:lstStyle/>
           <a:p>
             <a:pPr algn="ctr"/>
@@ -3661,8 +3668,8 @@
         </p:nvSpPr>
         <p:spPr>
           <a:xfrm>
-            <a:off x="580946" y="927100"/>
-            <a:ext cx="2740104" cy="3559739"/>
+            <a:off x="580946" y="772584"/>
+            <a:ext cx="2740104" cy="2966449"/>
           </a:xfrm>
           <a:prstGeom prst="rect">
             <a:avLst/>
@@ -3687,11 +3694,11 @@
           </a:fontRef>
         </p:style>
         <p:txBody>
-          <a:bodyPr rtlCol="0" anchor="t"/>
-          <a:lstStyle/>
-          <a:p>
-            <a:r>
-              <a:rPr lang="en-US" sz="1000" dirty="0" smtClean="0">
+          <a:bodyPr lIns="84902" tIns="42451" rIns="84902" bIns="42451" rtlCol="0" anchor="t"/>
+          <a:lstStyle/>
+          <a:p>
+            <a:r>
+              <a:rPr lang="en-US" sz="900" dirty="0">
                 <a:latin typeface="Monaco"/>
                 <a:cs typeface="Monaco"/>
               </a:rPr>
@@ -3700,7 +3707,7 @@
           </a:p>
           <a:p>
             <a:r>
-              <a:rPr lang="en-US" sz="1000" dirty="0" smtClean="0">
+              <a:rPr lang="en-US" sz="900" dirty="0">
                 <a:latin typeface="Monaco"/>
                 <a:cs typeface="Monaco"/>
               </a:rPr>
@@ -3709,7 +3716,7 @@
           </a:p>
           <a:p>
             <a:r>
-              <a:rPr lang="en-US" sz="1000" dirty="0" smtClean="0">
+              <a:rPr lang="en-US" sz="900" dirty="0">
                 <a:latin typeface="Monaco"/>
                 <a:cs typeface="Monaco"/>
               </a:rPr>
@@ -3718,7 +3725,7 @@
           </a:p>
           <a:p>
             <a:r>
-              <a:rPr lang="en-US" sz="1000" dirty="0" smtClean="0">
+              <a:rPr lang="en-US" sz="900" dirty="0">
                 <a:latin typeface="Monaco"/>
                 <a:cs typeface="Monaco"/>
               </a:rPr>
@@ -3727,7 +3734,7 @@
           </a:p>
           <a:p>
             <a:r>
-              <a:rPr lang="en-US" sz="1000" dirty="0" smtClean="0">
+              <a:rPr lang="en-US" sz="900" dirty="0">
                 <a:latin typeface="Monaco"/>
                 <a:cs typeface="Monaco"/>
               </a:rPr>
@@ -3736,36 +3743,25 @@
           </a:p>
           <a:p>
             <a:r>
-              <a:rPr lang="en-US" sz="1000" dirty="0" smtClean="0">
-                <a:latin typeface="Monaco"/>
-                <a:cs typeface="Monaco"/>
-              </a:rPr>
-              <a:t>⎯</a:t>
-            </a:r>
-            <a:r>
-              <a:rPr lang="en-US" sz="1000" dirty="0" smtClean="0">
-                <a:latin typeface="Monaco"/>
-                <a:cs typeface="Monaco"/>
-              </a:rPr>
-              <a:t>⎯⎯⎯⎯⎯⎯⎯⎯⎯⎯⎯⎯⎯⎯⎯</a:t>
-            </a:r>
-          </a:p>
-          <a:p>
-            <a:r>
-              <a:rPr lang="en-US" sz="1000" dirty="0" smtClean="0">
+              <a:rPr lang="en-US" sz="900" dirty="0">
+                <a:latin typeface="Monaco"/>
+                <a:cs typeface="Monaco"/>
+              </a:rPr>
+              <a:t>⎯⎯⎯⎯⎯⎯⎯⎯⎯⎯⎯⎯⎯⎯⎯⎯</a:t>
+            </a:r>
+          </a:p>
+          <a:p>
+            <a:r>
+              <a:rPr lang="en-US" sz="900" dirty="0">
                 <a:latin typeface="Monaco"/>
                 <a:cs typeface="Monaco"/>
               </a:rPr>
               <a:t>+ Controller(): &lt;constructor&gt;</a:t>
             </a:r>
-            <a:endParaRPr lang="en-US" sz="1000" dirty="0" smtClean="0">
-              <a:latin typeface="Monaco"/>
-              <a:cs typeface="Monaco"/>
-            </a:endParaRPr>
-          </a:p>
-          <a:p>
-            <a:r>
-              <a:rPr lang="en-US" sz="1000" dirty="0" smtClean="0">
+          </a:p>
+          <a:p>
+            <a:r>
+              <a:rPr lang="en-US" sz="900" dirty="0">
                 <a:latin typeface="Monaco"/>
                 <a:cs typeface="Monaco"/>
               </a:rPr>
@@ -3774,7 +3770,7 @@
           </a:p>
           <a:p>
             <a:r>
-              <a:rPr lang="en-US" sz="1000" dirty="0" smtClean="0">
+              <a:rPr lang="en-US" sz="900" dirty="0">
                 <a:latin typeface="Monaco"/>
                 <a:cs typeface="Monaco"/>
               </a:rPr>
@@ -3782,12 +3778,12 @@
             </a:r>
           </a:p>
           <a:p>
-            <a:pPr marL="171450" indent="-171450">
+            <a:pPr marL="159191" indent="-159191">
               <a:buFontTx/>
               <a:buChar char="-"/>
             </a:pPr>
             <a:r>
-              <a:rPr lang="en-US" sz="1000" dirty="0" smtClean="0">
+              <a:rPr lang="en-US" sz="900" dirty="0">
                 <a:latin typeface="Monaco"/>
                 <a:cs typeface="Monaco"/>
               </a:rPr>
@@ -3796,34 +3792,30 @@
           </a:p>
           <a:p>
             <a:r>
-              <a:rPr lang="en-US" sz="1000" dirty="0">
+              <a:rPr lang="en-US" sz="900" dirty="0">
                 <a:latin typeface="Monaco"/>
                 <a:cs typeface="Monaco"/>
               </a:rPr>
               <a:t>+</a:t>
             </a:r>
             <a:r>
-              <a:rPr lang="en-US" sz="1000" dirty="0" smtClean="0">
+              <a:rPr lang="en-US" sz="900" dirty="0">
                 <a:latin typeface="Monaco"/>
                 <a:cs typeface="Monaco"/>
               </a:rPr>
               <a:t> localGameButtonPressed(): void</a:t>
             </a:r>
-            <a:endParaRPr lang="en-US" sz="1000" dirty="0" smtClean="0">
-              <a:latin typeface="Monaco"/>
-              <a:cs typeface="Monaco"/>
-            </a:endParaRPr>
-          </a:p>
-          <a:p>
-            <a:r>
-              <a:rPr lang="en-US" sz="1000" dirty="0">
+          </a:p>
+          <a:p>
+            <a:r>
+              <a:rPr lang="en-US" sz="900" dirty="0">
                 <a:latin typeface="Monaco"/>
                 <a:cs typeface="Monaco"/>
               </a:rPr>
               <a:t>+</a:t>
             </a:r>
             <a:r>
-              <a:rPr lang="en-US" sz="1000" dirty="0" smtClean="0">
+              <a:rPr lang="en-US" sz="900" dirty="0">
                 <a:latin typeface="Monaco"/>
                 <a:cs typeface="Monaco"/>
               </a:rPr>
@@ -3832,14 +3824,14 @@
           </a:p>
           <a:p>
             <a:r>
-              <a:rPr lang="en-US" sz="1000" dirty="0">
+              <a:rPr lang="en-US" sz="900" dirty="0">
                 <a:latin typeface="Monaco"/>
                 <a:cs typeface="Monaco"/>
               </a:rPr>
               <a:t>+</a:t>
             </a:r>
             <a:r>
-              <a:rPr lang="en-US" sz="1000" dirty="0" smtClean="0">
+              <a:rPr lang="en-US" sz="900" dirty="0">
                 <a:latin typeface="Monaco"/>
                 <a:cs typeface="Monaco"/>
               </a:rPr>
@@ -3848,14 +3840,14 @@
           </a:p>
           <a:p>
             <a:r>
-              <a:rPr lang="en-US" sz="1000" dirty="0">
+              <a:rPr lang="en-US" sz="900" dirty="0">
                 <a:latin typeface="Monaco"/>
                 <a:cs typeface="Monaco"/>
               </a:rPr>
               <a:t>+</a:t>
             </a:r>
             <a:r>
-              <a:rPr lang="en-US" sz="1000" dirty="0" smtClean="0">
+              <a:rPr lang="en-US" sz="900" dirty="0">
                 <a:latin typeface="Monaco"/>
                 <a:cs typeface="Monaco"/>
               </a:rPr>
@@ -3864,14 +3856,14 @@
           </a:p>
           <a:p>
             <a:r>
-              <a:rPr lang="en-US" sz="1000" dirty="0">
+              <a:rPr lang="en-US" sz="900" dirty="0">
                 <a:latin typeface="Monaco"/>
                 <a:cs typeface="Monaco"/>
               </a:rPr>
               <a:t>+</a:t>
             </a:r>
             <a:r>
-              <a:rPr lang="en-US" sz="1000" dirty="0" smtClean="0">
+              <a:rPr lang="en-US" sz="900" dirty="0">
                 <a:latin typeface="Monaco"/>
                 <a:cs typeface="Monaco"/>
               </a:rPr>
@@ -3880,7 +3872,7 @@
           </a:p>
           <a:p>
             <a:r>
-              <a:rPr lang="en-US" sz="1000" dirty="0" smtClean="0">
+              <a:rPr lang="en-US" sz="900" dirty="0">
                 <a:latin typeface="Monaco"/>
                 <a:cs typeface="Monaco"/>
               </a:rPr>
@@ -3889,7 +3881,7 @@
           </a:p>
           <a:p>
             <a:r>
-              <a:rPr lang="en-US" sz="1000" dirty="0" smtClean="0">
+              <a:rPr lang="en-US" sz="900" dirty="0">
                 <a:latin typeface="Monaco"/>
                 <a:cs typeface="Monaco"/>
               </a:rPr>
@@ -3898,21 +3890,21 @@
           </a:p>
           <a:p>
             <a:r>
-              <a:rPr lang="en-US" sz="1000" dirty="0" smtClean="0">
+              <a:rPr lang="en-US" sz="900" dirty="0">
                 <a:latin typeface="Monaco"/>
                 <a:cs typeface="Monaco"/>
               </a:rPr>
               <a:t>- </a:t>
             </a:r>
             <a:r>
-              <a:rPr lang="en-US" sz="1000" dirty="0">
+              <a:rPr lang="en-US" sz="900" dirty="0">
                 <a:latin typeface="Monaco"/>
                 <a:cs typeface="Monaco"/>
               </a:rPr>
               <a:t>u</a:t>
             </a:r>
             <a:r>
-              <a:rPr lang="en-US" sz="1000" dirty="0" smtClean="0">
+              <a:rPr lang="en-US" sz="900" dirty="0">
                 <a:latin typeface="Monaco"/>
                 <a:cs typeface="Monaco"/>
               </a:rPr>
@@ -3929,8 +3921,8 @@
         </p:nvSpPr>
         <p:spPr>
           <a:xfrm>
-            <a:off x="4289346" y="1234017"/>
-            <a:ext cx="2740104" cy="1083733"/>
+            <a:off x="4289346" y="1028348"/>
+            <a:ext cx="2740104" cy="903111"/>
           </a:xfrm>
           <a:prstGeom prst="roundRect">
             <a:avLst/>
@@ -3951,7 +3943,7 @@
           </a:fontRef>
         </p:style>
         <p:txBody>
-          <a:bodyPr rtlCol="0" anchor="ctr"/>
+          <a:bodyPr lIns="84902" tIns="42451" rIns="84902" bIns="42451" rtlCol="0" anchor="ctr"/>
           <a:lstStyle/>
           <a:p>
             <a:pPr algn="ctr"/>
@@ -3967,7 +3959,7 @@
         </p:nvCxnSpPr>
         <p:spPr>
           <a:xfrm>
-            <a:off x="4292601" y="1691217"/>
+            <a:off x="4292602" y="1409348"/>
             <a:ext cx="2736849" cy="0"/>
           </a:xfrm>
           <a:prstGeom prst="line">
@@ -3998,8 +3990,8 @@
         </p:nvSpPr>
         <p:spPr>
           <a:xfrm>
-            <a:off x="4289346" y="1234017"/>
-            <a:ext cx="2740104" cy="457200"/>
+            <a:off x="4289346" y="1028348"/>
+            <a:ext cx="2740104" cy="381000"/>
           </a:xfrm>
           <a:prstGeom prst="rect">
             <a:avLst/>
@@ -4024,7 +4016,7 @@
           </a:fontRef>
         </p:style>
         <p:txBody>
-          <a:bodyPr rtlCol="0" anchor="ctr"/>
+          <a:bodyPr lIns="84902" tIns="42451" rIns="84902" bIns="42451" rtlCol="0" anchor="ctr"/>
           <a:lstStyle/>
           <a:p>
             <a:pPr algn="ctr"/>
@@ -4050,8 +4042,8 @@
         </p:nvSpPr>
         <p:spPr>
           <a:xfrm>
-            <a:off x="4289346" y="1708151"/>
-            <a:ext cx="2740104" cy="609600"/>
+            <a:off x="4289346" y="1423459"/>
+            <a:ext cx="2740104" cy="508000"/>
           </a:xfrm>
           <a:prstGeom prst="rect">
             <a:avLst/>
@@ -4076,11 +4068,11 @@
           </a:fontRef>
         </p:style>
         <p:txBody>
-          <a:bodyPr rtlCol="0" anchor="t"/>
-          <a:lstStyle/>
-          <a:p>
-            <a:r>
-              <a:rPr lang="en-US" sz="1000" dirty="0" smtClean="0">
+          <a:bodyPr lIns="84902" tIns="42451" rIns="84902" bIns="42451" rtlCol="0" anchor="t"/>
+          <a:lstStyle/>
+          <a:p>
+            <a:r>
+              <a:rPr lang="en-US" sz="900" dirty="0">
                 <a:latin typeface="Monaco"/>
                 <a:cs typeface="Monaco"/>
               </a:rPr>
@@ -4089,7 +4081,7 @@
           </a:p>
           <a:p>
             <a:r>
-              <a:rPr lang="en-US" sz="1000" dirty="0" smtClean="0">
+              <a:rPr lang="en-US" sz="900" dirty="0">
                 <a:latin typeface="Monaco"/>
                 <a:cs typeface="Monaco"/>
               </a:rPr>
@@ -4098,16 +4090,12 @@
           </a:p>
           <a:p>
             <a:r>
-              <a:rPr lang="en-US" sz="1000" dirty="0" smtClean="0">
+              <a:rPr lang="en-US" sz="900" dirty="0">
                 <a:latin typeface="Monaco"/>
                 <a:cs typeface="Monaco"/>
               </a:rPr>
               <a:t>REMOTE_GAME</a:t>
             </a:r>
-            <a:endParaRPr lang="en-US" sz="1000" dirty="0" smtClean="0">
-              <a:latin typeface="Monaco"/>
-              <a:cs typeface="Monaco"/>
-            </a:endParaRPr>
           </a:p>
         </p:txBody>
       </p:sp>
@@ -4119,8 +4107,8 @@
         </p:nvSpPr>
         <p:spPr>
           <a:xfrm>
-            <a:off x="4289346" y="776817"/>
-            <a:ext cx="2740104" cy="457200"/>
+            <a:off x="4289346" y="647348"/>
+            <a:ext cx="2740104" cy="381000"/>
           </a:xfrm>
           <a:prstGeom prst="rect">
             <a:avLst/>
@@ -4145,7 +4133,7 @@
           </a:fontRef>
         </p:style>
         <p:txBody>
-          <a:bodyPr rtlCol="0" anchor="ctr"/>
+          <a:bodyPr lIns="84902" tIns="42451" rIns="84902" bIns="42451" rtlCol="0" anchor="ctr"/>
           <a:lstStyle/>
           <a:p>
             <a:pPr algn="ctr"/>
@@ -4171,8 +4159,8 @@
         </p:nvSpPr>
         <p:spPr>
           <a:xfrm>
-            <a:off x="3321050" y="1409700"/>
-            <a:ext cx="273050" cy="281517"/>
+            <a:off x="3321050" y="1174751"/>
+            <a:ext cx="273050" cy="234598"/>
           </a:xfrm>
           <a:prstGeom prst="diamond">
             <a:avLst/>
@@ -4195,11 +4183,11 @@
           </a:fontRef>
         </p:style>
         <p:txBody>
-          <a:bodyPr rtlCol="0" anchor="ctr"/>
+          <a:bodyPr lIns="84902" tIns="42451" rIns="84902" bIns="42451" rtlCol="0" anchor="ctr"/>
           <a:lstStyle/>
           <a:p>
             <a:pPr algn="ctr"/>
-            <a:endParaRPr lang="en-US"/>
+            <a:endParaRPr lang="en-US" dirty="0"/>
           </a:p>
         </p:txBody>
       </p:sp>
@@ -4213,7 +4201,7 @@
         </p:nvCxnSpPr>
         <p:spPr>
           <a:xfrm>
-            <a:off x="3594100" y="1550459"/>
+            <a:off x="3594100" y="1292050"/>
             <a:ext cx="695246" cy="0"/>
           </a:xfrm>
           <a:prstGeom prst="line">
@@ -4244,8 +4232,8 @@
         </p:nvSpPr>
         <p:spPr>
           <a:xfrm>
-            <a:off x="3511550" y="1176894"/>
-            <a:ext cx="254000" cy="369332"/>
+            <a:off x="3511550" y="980746"/>
+            <a:ext cx="254000" cy="347341"/>
           </a:xfrm>
           <a:prstGeom prst="rect">
             <a:avLst/>
@@ -4253,7 +4241,7 @@
           <a:noFill/>
         </p:spPr>
         <p:txBody>
-          <a:bodyPr wrap="square" rtlCol="0">
+          <a:bodyPr wrap="square" lIns="84902" tIns="42451" rIns="84902" bIns="42451" rtlCol="0">
             <a:spAutoFit/>
           </a:bodyPr>
           <a:lstStyle/>
@@ -4274,8 +4262,8 @@
         </p:nvSpPr>
         <p:spPr>
           <a:xfrm>
-            <a:off x="4022724" y="1176894"/>
-            <a:ext cx="244545" cy="369332"/>
+            <a:off x="4022725" y="980746"/>
+            <a:ext cx="244545" cy="347341"/>
           </a:xfrm>
           <a:prstGeom prst="rect">
             <a:avLst/>
@@ -4283,7 +4271,7 @@
           <a:noFill/>
         </p:spPr>
         <p:txBody>
-          <a:bodyPr wrap="square" rtlCol="0">
+          <a:bodyPr wrap="square" lIns="84902" tIns="42451" rIns="84902" bIns="42451" rtlCol="0">
             <a:spAutoFit/>
           </a:bodyPr>
           <a:lstStyle/>
@@ -4300,6 +4288,1796 @@
     <p:extLst>
       <p:ext uri="{BB962C8B-B14F-4D97-AF65-F5344CB8AC3E}">
         <p14:creationId xmlns:p14="http://schemas.microsoft.com/office/powerpoint/2010/main" val="2696821859"/>
+      </p:ext>
+    </p:extLst>
+  </p:cSld>
+  <p:clrMapOvr>
+    <a:masterClrMapping/>
+  </p:clrMapOvr>
+</p:sld>
+</file>
+
+<file path=ppt/slides/slide2.xml><?xml version="1.0" encoding="utf-8"?>
+<p:sld xmlns:a="http://schemas.openxmlformats.org/drawingml/2006/main" xmlns:r="http://schemas.openxmlformats.org/officeDocument/2006/relationships" xmlns:p="http://schemas.openxmlformats.org/presentationml/2006/main">
+  <p:cSld>
+    <p:spTree>
+      <p:nvGrpSpPr>
+        <p:cNvPr id="1" name=""/>
+        <p:cNvGrpSpPr/>
+        <p:nvPr/>
+      </p:nvGrpSpPr>
+      <p:grpSpPr>
+        <a:xfrm>
+          <a:off x="0" y="0"/>
+          <a:ext cx="0" cy="0"/>
+          <a:chOff x="0" y="0"/>
+          <a:chExt cx="0" cy="0"/>
+        </a:xfrm>
+      </p:grpSpPr>
+      <p:sp>
+        <p:nvSpPr>
+          <p:cNvPr id="4" name="Rounded Rectangle 3"/>
+          <p:cNvSpPr/>
+          <p:nvPr/>
+        </p:nvSpPr>
+        <p:spPr>
+          <a:xfrm>
+            <a:off x="254410" y="3074458"/>
+            <a:ext cx="2395089" cy="1682750"/>
+          </a:xfrm>
+          <a:prstGeom prst="roundRect">
+            <a:avLst/>
+          </a:prstGeom>
+        </p:spPr>
+        <p:style>
+          <a:lnRef idx="2">
+            <a:schemeClr val="dk1"/>
+          </a:lnRef>
+          <a:fillRef idx="1">
+            <a:schemeClr val="lt1"/>
+          </a:fillRef>
+          <a:effectRef idx="0">
+            <a:schemeClr val="dk1"/>
+          </a:effectRef>
+          <a:fontRef idx="minor">
+            <a:schemeClr val="dk1"/>
+          </a:fontRef>
+        </p:style>
+        <p:txBody>
+          <a:bodyPr lIns="84902" tIns="42451" rIns="84902" bIns="42451" rtlCol="0" anchor="ctr"/>
+          <a:lstStyle/>
+          <a:p>
+            <a:pPr algn="ctr"/>
+            <a:endParaRPr lang="en-US" dirty="0"/>
+          </a:p>
+        </p:txBody>
+      </p:sp>
+      <p:cxnSp>
+        <p:nvCxnSpPr>
+          <p:cNvPr id="5" name="Straight Connector 4"/>
+          <p:cNvCxnSpPr/>
+          <p:nvPr/>
+        </p:nvCxnSpPr>
+        <p:spPr>
+          <a:xfrm>
+            <a:off x="257664" y="3455457"/>
+            <a:ext cx="2391834" cy="0"/>
+          </a:xfrm>
+          <a:prstGeom prst="line">
+            <a:avLst/>
+          </a:prstGeom>
+          <a:effectLst/>
+        </p:spPr>
+        <p:style>
+          <a:lnRef idx="2">
+            <a:schemeClr val="dk1"/>
+          </a:lnRef>
+          <a:fillRef idx="0">
+            <a:schemeClr val="dk1"/>
+          </a:fillRef>
+          <a:effectRef idx="1">
+            <a:schemeClr val="dk1"/>
+          </a:effectRef>
+          <a:fontRef idx="minor">
+            <a:schemeClr val="tx1"/>
+          </a:fontRef>
+        </p:style>
+      </p:cxnSp>
+      <p:sp>
+        <p:nvSpPr>
+          <p:cNvPr id="6" name="Rectangle 5"/>
+          <p:cNvSpPr/>
+          <p:nvPr/>
+        </p:nvSpPr>
+        <p:spPr>
+          <a:xfrm>
+            <a:off x="254410" y="3074457"/>
+            <a:ext cx="2395089" cy="381000"/>
+          </a:xfrm>
+          <a:prstGeom prst="rect">
+            <a:avLst/>
+          </a:prstGeom>
+          <a:noFill/>
+          <a:ln>
+            <a:noFill/>
+          </a:ln>
+        </p:spPr>
+        <p:style>
+          <a:lnRef idx="2">
+            <a:schemeClr val="dk1"/>
+          </a:lnRef>
+          <a:fillRef idx="1">
+            <a:schemeClr val="lt1"/>
+          </a:fillRef>
+          <a:effectRef idx="0">
+            <a:schemeClr val="dk1"/>
+          </a:effectRef>
+          <a:fontRef idx="minor">
+            <a:schemeClr val="dk1"/>
+          </a:fontRef>
+        </p:style>
+        <p:txBody>
+          <a:bodyPr lIns="84902" tIns="42451" rIns="84902" bIns="42451" rtlCol="0" anchor="ctr"/>
+          <a:lstStyle/>
+          <a:p>
+            <a:pPr algn="ctr"/>
+            <a:r>
+              <a:rPr lang="en-US" dirty="0" smtClean="0">
+                <a:latin typeface="Monaco"/>
+                <a:cs typeface="Monaco"/>
+              </a:rPr>
+              <a:t>MainMenuPanel</a:t>
+            </a:r>
+            <a:endParaRPr lang="en-US" dirty="0">
+              <a:latin typeface="Monaco"/>
+              <a:cs typeface="Monaco"/>
+            </a:endParaRPr>
+          </a:p>
+        </p:txBody>
+      </p:sp>
+      <p:sp>
+        <p:nvSpPr>
+          <p:cNvPr id="7" name="Rectangle 6"/>
+          <p:cNvSpPr/>
+          <p:nvPr/>
+        </p:nvSpPr>
+        <p:spPr>
+          <a:xfrm>
+            <a:off x="254410" y="3469569"/>
+            <a:ext cx="2395089" cy="1287640"/>
+          </a:xfrm>
+          <a:prstGeom prst="rect">
+            <a:avLst/>
+          </a:prstGeom>
+          <a:noFill/>
+          <a:ln>
+            <a:noFill/>
+          </a:ln>
+        </p:spPr>
+        <p:style>
+          <a:lnRef idx="2">
+            <a:schemeClr val="dk1"/>
+          </a:lnRef>
+          <a:fillRef idx="1">
+            <a:schemeClr val="lt1"/>
+          </a:fillRef>
+          <a:effectRef idx="0">
+            <a:schemeClr val="dk1"/>
+          </a:effectRef>
+          <a:fontRef idx="minor">
+            <a:schemeClr val="dk1"/>
+          </a:fontRef>
+        </p:style>
+        <p:txBody>
+          <a:bodyPr lIns="84902" tIns="42451" rIns="84902" bIns="42451" rtlCol="0" anchor="t"/>
+          <a:lstStyle/>
+          <a:p>
+            <a:r>
+              <a:rPr lang="en-US" sz="900" dirty="0">
+                <a:latin typeface="Monaco"/>
+                <a:cs typeface="Monaco"/>
+              </a:rPr>
+              <a:t>- JButton localGameButton</a:t>
+            </a:r>
+          </a:p>
+          <a:p>
+            <a:r>
+              <a:rPr lang="en-US" sz="900" dirty="0">
+                <a:latin typeface="Monaco"/>
+                <a:cs typeface="Monaco"/>
+              </a:rPr>
+              <a:t>- JButton remoteGameButton</a:t>
+            </a:r>
+          </a:p>
+          <a:p>
+            <a:r>
+              <a:rPr lang="en-US" sz="900" dirty="0">
+                <a:latin typeface="Monaco"/>
+                <a:cs typeface="Monaco"/>
+              </a:rPr>
+              <a:t>- Controller controller</a:t>
+            </a:r>
+          </a:p>
+          <a:p>
+            <a:r>
+              <a:rPr lang="en-US" sz="900" dirty="0">
+                <a:latin typeface="Monaco"/>
+                <a:cs typeface="Monaco"/>
+              </a:rPr>
+              <a:t>⎯⎯⎯⎯⎯⎯⎯⎯⎯⎯⎯⎯⎯⎯⎯⎯</a:t>
+            </a:r>
+          </a:p>
+          <a:p>
+            <a:r>
+              <a:rPr lang="en-US" sz="900" dirty="0">
+                <a:latin typeface="Monaco"/>
+                <a:cs typeface="Monaco"/>
+              </a:rPr>
+              <a:t>+ MainMenuPanel(Controller): 	&lt;constructor&gt;</a:t>
+            </a:r>
+          </a:p>
+          <a:p>
+            <a:r>
+              <a:rPr lang="en-US" sz="900" dirty="0">
+                <a:latin typeface="Monaco"/>
+                <a:cs typeface="Monaco"/>
+              </a:rPr>
+              <a:t>- createButtons(): void</a:t>
+            </a:r>
+          </a:p>
+        </p:txBody>
+      </p:sp>
+      <p:sp>
+        <p:nvSpPr>
+          <p:cNvPr id="9" name="Rounded Rectangle 8"/>
+          <p:cNvSpPr/>
+          <p:nvPr/>
+        </p:nvSpPr>
+        <p:spPr>
+          <a:xfrm>
+            <a:off x="579399" y="1317625"/>
+            <a:ext cx="2740104" cy="381000"/>
+          </a:xfrm>
+          <a:prstGeom prst="roundRect">
+            <a:avLst/>
+          </a:prstGeom>
+        </p:spPr>
+        <p:style>
+          <a:lnRef idx="2">
+            <a:schemeClr val="dk1"/>
+          </a:lnRef>
+          <a:fillRef idx="1">
+            <a:schemeClr val="lt1"/>
+          </a:fillRef>
+          <a:effectRef idx="0">
+            <a:schemeClr val="dk1"/>
+          </a:effectRef>
+          <a:fontRef idx="minor">
+            <a:schemeClr val="dk1"/>
+          </a:fontRef>
+        </p:style>
+        <p:txBody>
+          <a:bodyPr lIns="84902" tIns="42451" rIns="84902" bIns="42451" rtlCol="0" anchor="ctr"/>
+          <a:lstStyle/>
+          <a:p>
+            <a:pPr algn="ctr"/>
+            <a:endParaRPr lang="en-US" dirty="0"/>
+          </a:p>
+        </p:txBody>
+      </p:sp>
+      <p:sp>
+        <p:nvSpPr>
+          <p:cNvPr id="11" name="Rectangle 10"/>
+          <p:cNvSpPr/>
+          <p:nvPr/>
+        </p:nvSpPr>
+        <p:spPr>
+          <a:xfrm>
+            <a:off x="579399" y="1317624"/>
+            <a:ext cx="2740104" cy="381000"/>
+          </a:xfrm>
+          <a:prstGeom prst="rect">
+            <a:avLst/>
+          </a:prstGeom>
+          <a:noFill/>
+          <a:ln>
+            <a:noFill/>
+          </a:ln>
+        </p:spPr>
+        <p:style>
+          <a:lnRef idx="2">
+            <a:schemeClr val="dk1"/>
+          </a:lnRef>
+          <a:fillRef idx="1">
+            <a:schemeClr val="lt1"/>
+          </a:fillRef>
+          <a:effectRef idx="0">
+            <a:schemeClr val="dk1"/>
+          </a:effectRef>
+          <a:fontRef idx="minor">
+            <a:schemeClr val="dk1"/>
+          </a:fontRef>
+        </p:style>
+        <p:txBody>
+          <a:bodyPr lIns="84902" tIns="42451" rIns="84902" bIns="42451" rtlCol="0" anchor="ctr"/>
+          <a:lstStyle/>
+          <a:p>
+            <a:pPr algn="ctr"/>
+            <a:r>
+              <a:rPr lang="en-US" dirty="0" smtClean="0">
+                <a:latin typeface="Monaco"/>
+                <a:cs typeface="Monaco"/>
+              </a:rPr>
+              <a:t>JPanel</a:t>
+            </a:r>
+            <a:endParaRPr lang="en-US" dirty="0">
+              <a:latin typeface="Monaco"/>
+              <a:cs typeface="Monaco"/>
+            </a:endParaRPr>
+          </a:p>
+        </p:txBody>
+      </p:sp>
+      <p:sp>
+        <p:nvSpPr>
+          <p:cNvPr id="13" name="Rectangle 12"/>
+          <p:cNvSpPr/>
+          <p:nvPr/>
+        </p:nvSpPr>
+        <p:spPr>
+          <a:xfrm>
+            <a:off x="579399" y="936624"/>
+            <a:ext cx="2740104" cy="381000"/>
+          </a:xfrm>
+          <a:prstGeom prst="rect">
+            <a:avLst/>
+          </a:prstGeom>
+          <a:noFill/>
+          <a:ln>
+            <a:noFill/>
+          </a:ln>
+        </p:spPr>
+        <p:style>
+          <a:lnRef idx="2">
+            <a:schemeClr val="dk1"/>
+          </a:lnRef>
+          <a:fillRef idx="1">
+            <a:schemeClr val="lt1"/>
+          </a:fillRef>
+          <a:effectRef idx="0">
+            <a:schemeClr val="dk1"/>
+          </a:effectRef>
+          <a:fontRef idx="minor">
+            <a:schemeClr val="dk1"/>
+          </a:fontRef>
+        </p:style>
+        <p:txBody>
+          <a:bodyPr lIns="84902" tIns="42451" rIns="84902" bIns="42451" rtlCol="0" anchor="ctr"/>
+          <a:lstStyle/>
+          <a:p>
+            <a:pPr algn="ctr"/>
+            <a:r>
+              <a:rPr lang="en-US" dirty="0" smtClean="0">
+                <a:latin typeface="Monaco"/>
+                <a:cs typeface="Monaco"/>
+              </a:rPr>
+              <a:t>&lt;</a:t>
+            </a:r>
+            <a:r>
+              <a:rPr lang="en-US" dirty="0" smtClean="0">
+                <a:latin typeface="Monaco"/>
+                <a:cs typeface="Monaco"/>
+              </a:rPr>
+              <a:t>&lt;interface&gt;</a:t>
+            </a:r>
+            <a:r>
+              <a:rPr lang="en-US" dirty="0" smtClean="0">
+                <a:latin typeface="Monaco"/>
+                <a:cs typeface="Monaco"/>
+              </a:rPr>
+              <a:t>&gt;</a:t>
+            </a:r>
+            <a:endParaRPr lang="en-US" dirty="0">
+              <a:latin typeface="Monaco"/>
+              <a:cs typeface="Monaco"/>
+            </a:endParaRPr>
+          </a:p>
+        </p:txBody>
+      </p:sp>
+      <p:cxnSp>
+        <p:nvCxnSpPr>
+          <p:cNvPr id="15" name="Straight Connector 14"/>
+          <p:cNvCxnSpPr>
+            <a:stCxn id="19" idx="3"/>
+          </p:cNvCxnSpPr>
+          <p:nvPr/>
+        </p:nvCxnSpPr>
+        <p:spPr>
+          <a:xfrm>
+            <a:off x="1951487" y="1933221"/>
+            <a:ext cx="0" cy="841376"/>
+          </a:xfrm>
+          <a:prstGeom prst="line">
+            <a:avLst/>
+          </a:prstGeom>
+          <a:effectLst/>
+        </p:spPr>
+        <p:style>
+          <a:lnRef idx="2">
+            <a:schemeClr val="dk1"/>
+          </a:lnRef>
+          <a:fillRef idx="0">
+            <a:schemeClr val="dk1"/>
+          </a:fillRef>
+          <a:effectRef idx="1">
+            <a:schemeClr val="dk1"/>
+          </a:effectRef>
+          <a:fontRef idx="minor">
+            <a:schemeClr val="tx1"/>
+          </a:fontRef>
+        </p:style>
+      </p:cxnSp>
+      <p:sp>
+        <p:nvSpPr>
+          <p:cNvPr id="19" name="Isosceles Triangle 18"/>
+          <p:cNvSpPr/>
+          <p:nvPr/>
+        </p:nvSpPr>
+        <p:spPr>
+          <a:xfrm>
+            <a:off x="1781625" y="1698625"/>
+            <a:ext cx="339724" cy="234596"/>
+          </a:xfrm>
+          <a:prstGeom prst="triangle">
+            <a:avLst/>
+          </a:prstGeom>
+          <a:noFill/>
+        </p:spPr>
+        <p:style>
+          <a:lnRef idx="2">
+            <a:schemeClr val="dk1">
+              <a:shade val="50000"/>
+            </a:schemeClr>
+          </a:lnRef>
+          <a:fillRef idx="1">
+            <a:schemeClr val="dk1"/>
+          </a:fillRef>
+          <a:effectRef idx="0">
+            <a:schemeClr val="dk1"/>
+          </a:effectRef>
+          <a:fontRef idx="minor">
+            <a:schemeClr val="lt1"/>
+          </a:fontRef>
+        </p:style>
+        <p:txBody>
+          <a:bodyPr lIns="84902" tIns="42451" rIns="84902" bIns="42451" spcCol="0" rtlCol="0" anchor="ctr"/>
+          <a:lstStyle/>
+          <a:p>
+            <a:pPr algn="ctr"/>
+            <a:endParaRPr lang="en-US" dirty="0"/>
+          </a:p>
+        </p:txBody>
+      </p:sp>
+      <p:sp>
+        <p:nvSpPr>
+          <p:cNvPr id="22" name="Rounded Rectangle 21"/>
+          <p:cNvSpPr/>
+          <p:nvPr/>
+        </p:nvSpPr>
+        <p:spPr>
+          <a:xfrm>
+            <a:off x="2819809" y="3074459"/>
+            <a:ext cx="2740104" cy="1682750"/>
+          </a:xfrm>
+          <a:prstGeom prst="roundRect">
+            <a:avLst/>
+          </a:prstGeom>
+        </p:spPr>
+        <p:style>
+          <a:lnRef idx="2">
+            <a:schemeClr val="dk1"/>
+          </a:lnRef>
+          <a:fillRef idx="1">
+            <a:schemeClr val="lt1"/>
+          </a:fillRef>
+          <a:effectRef idx="0">
+            <a:schemeClr val="dk1"/>
+          </a:effectRef>
+          <a:fontRef idx="minor">
+            <a:schemeClr val="dk1"/>
+          </a:fontRef>
+        </p:style>
+        <p:txBody>
+          <a:bodyPr lIns="84902" tIns="42451" rIns="84902" bIns="42451" rtlCol="0" anchor="ctr"/>
+          <a:lstStyle/>
+          <a:p>
+            <a:pPr algn="ctr"/>
+            <a:endParaRPr lang="en-US" dirty="0"/>
+          </a:p>
+        </p:txBody>
+      </p:sp>
+      <p:cxnSp>
+        <p:nvCxnSpPr>
+          <p:cNvPr id="23" name="Straight Connector 22"/>
+          <p:cNvCxnSpPr/>
+          <p:nvPr/>
+        </p:nvCxnSpPr>
+        <p:spPr>
+          <a:xfrm>
+            <a:off x="2823065" y="3455458"/>
+            <a:ext cx="2736849" cy="0"/>
+          </a:xfrm>
+          <a:prstGeom prst="line">
+            <a:avLst/>
+          </a:prstGeom>
+          <a:effectLst/>
+        </p:spPr>
+        <p:style>
+          <a:lnRef idx="2">
+            <a:schemeClr val="dk1"/>
+          </a:lnRef>
+          <a:fillRef idx="0">
+            <a:schemeClr val="dk1"/>
+          </a:fillRef>
+          <a:effectRef idx="1">
+            <a:schemeClr val="dk1"/>
+          </a:effectRef>
+          <a:fontRef idx="minor">
+            <a:schemeClr val="tx1"/>
+          </a:fontRef>
+        </p:style>
+      </p:cxnSp>
+      <p:sp>
+        <p:nvSpPr>
+          <p:cNvPr id="24" name="Rectangle 23"/>
+          <p:cNvSpPr/>
+          <p:nvPr/>
+        </p:nvSpPr>
+        <p:spPr>
+          <a:xfrm>
+            <a:off x="2819809" y="3074458"/>
+            <a:ext cx="2740104" cy="381000"/>
+          </a:xfrm>
+          <a:prstGeom prst="rect">
+            <a:avLst/>
+          </a:prstGeom>
+          <a:noFill/>
+          <a:ln>
+            <a:noFill/>
+          </a:ln>
+        </p:spPr>
+        <p:style>
+          <a:lnRef idx="2">
+            <a:schemeClr val="dk1"/>
+          </a:lnRef>
+          <a:fillRef idx="1">
+            <a:schemeClr val="lt1"/>
+          </a:fillRef>
+          <a:effectRef idx="0">
+            <a:schemeClr val="dk1"/>
+          </a:effectRef>
+          <a:fontRef idx="minor">
+            <a:schemeClr val="dk1"/>
+          </a:fontRef>
+        </p:style>
+        <p:txBody>
+          <a:bodyPr lIns="84902" tIns="42451" rIns="84902" bIns="42451" rtlCol="0" anchor="ctr"/>
+          <a:lstStyle/>
+          <a:p>
+            <a:pPr algn="ctr"/>
+            <a:r>
+              <a:rPr lang="en-US" sz="1400" dirty="0">
+                <a:latin typeface="Monaco"/>
+                <a:cs typeface="Monaco"/>
+              </a:rPr>
+              <a:t>RemoteGameChoicePanel</a:t>
+            </a:r>
+            <a:endParaRPr lang="en-US" sz="1400" dirty="0">
+              <a:latin typeface="Monaco"/>
+              <a:cs typeface="Monaco"/>
+            </a:endParaRPr>
+          </a:p>
+        </p:txBody>
+      </p:sp>
+      <p:sp>
+        <p:nvSpPr>
+          <p:cNvPr id="25" name="Rectangle 24"/>
+          <p:cNvSpPr/>
+          <p:nvPr/>
+        </p:nvSpPr>
+        <p:spPr>
+          <a:xfrm>
+            <a:off x="2819809" y="3469570"/>
+            <a:ext cx="2740104" cy="1287640"/>
+          </a:xfrm>
+          <a:prstGeom prst="rect">
+            <a:avLst/>
+          </a:prstGeom>
+          <a:noFill/>
+          <a:ln>
+            <a:noFill/>
+          </a:ln>
+        </p:spPr>
+        <p:style>
+          <a:lnRef idx="2">
+            <a:schemeClr val="dk1"/>
+          </a:lnRef>
+          <a:fillRef idx="1">
+            <a:schemeClr val="lt1"/>
+          </a:fillRef>
+          <a:effectRef idx="0">
+            <a:schemeClr val="dk1"/>
+          </a:effectRef>
+          <a:fontRef idx="minor">
+            <a:schemeClr val="dk1"/>
+          </a:fontRef>
+        </p:style>
+        <p:txBody>
+          <a:bodyPr lIns="84902" tIns="42451" rIns="84902" bIns="42451" rtlCol="0" anchor="t"/>
+          <a:lstStyle/>
+          <a:p>
+            <a:r>
+              <a:rPr lang="en-US" sz="900" dirty="0">
+                <a:latin typeface="Monaco"/>
+                <a:cs typeface="Monaco"/>
+              </a:rPr>
+              <a:t>- JButton localGameButton</a:t>
+            </a:r>
+          </a:p>
+          <a:p>
+            <a:r>
+              <a:rPr lang="en-US" sz="900" dirty="0">
+                <a:latin typeface="Monaco"/>
+                <a:cs typeface="Monaco"/>
+              </a:rPr>
+              <a:t>- JButton remoteGameButton</a:t>
+            </a:r>
+          </a:p>
+          <a:p>
+            <a:r>
+              <a:rPr lang="en-US" sz="900" dirty="0">
+                <a:latin typeface="Monaco"/>
+                <a:cs typeface="Monaco"/>
+              </a:rPr>
+              <a:t>- Controller controller</a:t>
+            </a:r>
+          </a:p>
+          <a:p>
+            <a:r>
+              <a:rPr lang="en-US" sz="900" dirty="0">
+                <a:latin typeface="Monaco"/>
+                <a:cs typeface="Monaco"/>
+              </a:rPr>
+              <a:t>⎯⎯⎯⎯⎯⎯⎯⎯⎯⎯⎯⎯⎯⎯⎯⎯</a:t>
+            </a:r>
+          </a:p>
+          <a:p>
+            <a:r>
+              <a:rPr lang="en-US" sz="900" dirty="0">
+                <a:latin typeface="Monaco"/>
+                <a:cs typeface="Monaco"/>
+              </a:rPr>
+              <a:t>+ MainMenuPanel(Controller): 	&lt;constructor&gt;</a:t>
+            </a:r>
+          </a:p>
+          <a:p>
+            <a:r>
+              <a:rPr lang="en-US" sz="900" dirty="0">
+                <a:latin typeface="Monaco"/>
+                <a:cs typeface="Monaco"/>
+              </a:rPr>
+              <a:t>- createButtons(): void</a:t>
+            </a:r>
+          </a:p>
+        </p:txBody>
+      </p:sp>
+      <p:cxnSp>
+        <p:nvCxnSpPr>
+          <p:cNvPr id="27" name="Straight Connector 26"/>
+          <p:cNvCxnSpPr/>
+          <p:nvPr/>
+        </p:nvCxnSpPr>
+        <p:spPr>
+          <a:xfrm>
+            <a:off x="1451955" y="2774597"/>
+            <a:ext cx="5347612" cy="0"/>
+          </a:xfrm>
+          <a:prstGeom prst="line">
+            <a:avLst/>
+          </a:prstGeom>
+          <a:effectLst/>
+        </p:spPr>
+        <p:style>
+          <a:lnRef idx="2">
+            <a:schemeClr val="dk1"/>
+          </a:lnRef>
+          <a:fillRef idx="0">
+            <a:schemeClr val="dk1"/>
+          </a:fillRef>
+          <a:effectRef idx="1">
+            <a:schemeClr val="dk1"/>
+          </a:effectRef>
+          <a:fontRef idx="minor">
+            <a:schemeClr val="tx1"/>
+          </a:fontRef>
+        </p:style>
+      </p:cxnSp>
+      <p:cxnSp>
+        <p:nvCxnSpPr>
+          <p:cNvPr id="30" name="Straight Connector 29"/>
+          <p:cNvCxnSpPr>
+            <a:endCxn id="22" idx="0"/>
+          </p:cNvCxnSpPr>
+          <p:nvPr/>
+        </p:nvCxnSpPr>
+        <p:spPr>
+          <a:xfrm flipH="1">
+            <a:off x="4189862" y="2774596"/>
+            <a:ext cx="569" cy="299863"/>
+          </a:xfrm>
+          <a:prstGeom prst="line">
+            <a:avLst/>
+          </a:prstGeom>
+          <a:effectLst/>
+        </p:spPr>
+        <p:style>
+          <a:lnRef idx="2">
+            <a:schemeClr val="dk1"/>
+          </a:lnRef>
+          <a:fillRef idx="0">
+            <a:schemeClr val="dk1"/>
+          </a:fillRef>
+          <a:effectRef idx="1">
+            <a:schemeClr val="dk1"/>
+          </a:effectRef>
+          <a:fontRef idx="minor">
+            <a:schemeClr val="tx1"/>
+          </a:fontRef>
+        </p:style>
+      </p:cxnSp>
+      <p:cxnSp>
+        <p:nvCxnSpPr>
+          <p:cNvPr id="44" name="Straight Connector 43"/>
+          <p:cNvCxnSpPr/>
+          <p:nvPr/>
+        </p:nvCxnSpPr>
+        <p:spPr>
+          <a:xfrm>
+            <a:off x="1451954" y="2774595"/>
+            <a:ext cx="0" cy="299862"/>
+          </a:xfrm>
+          <a:prstGeom prst="line">
+            <a:avLst/>
+          </a:prstGeom>
+          <a:effectLst/>
+        </p:spPr>
+        <p:style>
+          <a:lnRef idx="2">
+            <a:schemeClr val="dk1"/>
+          </a:lnRef>
+          <a:fillRef idx="0">
+            <a:schemeClr val="dk1"/>
+          </a:fillRef>
+          <a:effectRef idx="1">
+            <a:schemeClr val="dk1"/>
+          </a:effectRef>
+          <a:fontRef idx="minor">
+            <a:schemeClr val="tx1"/>
+          </a:fontRef>
+        </p:style>
+      </p:cxnSp>
+      <p:sp>
+        <p:nvSpPr>
+          <p:cNvPr id="46" name="Rounded Rectangle 45"/>
+          <p:cNvSpPr/>
+          <p:nvPr/>
+        </p:nvSpPr>
+        <p:spPr>
+          <a:xfrm>
+            <a:off x="5783143" y="3074457"/>
+            <a:ext cx="2039489" cy="1682750"/>
+          </a:xfrm>
+          <a:prstGeom prst="roundRect">
+            <a:avLst/>
+          </a:prstGeom>
+        </p:spPr>
+        <p:style>
+          <a:lnRef idx="2">
+            <a:schemeClr val="dk1"/>
+          </a:lnRef>
+          <a:fillRef idx="1">
+            <a:schemeClr val="lt1"/>
+          </a:fillRef>
+          <a:effectRef idx="0">
+            <a:schemeClr val="dk1"/>
+          </a:effectRef>
+          <a:fontRef idx="minor">
+            <a:schemeClr val="dk1"/>
+          </a:fontRef>
+        </p:style>
+        <p:txBody>
+          <a:bodyPr lIns="84902" tIns="42451" rIns="84902" bIns="42451" rtlCol="0" anchor="ctr"/>
+          <a:lstStyle/>
+          <a:p>
+            <a:pPr algn="ctr"/>
+            <a:endParaRPr lang="en-US" dirty="0"/>
+          </a:p>
+        </p:txBody>
+      </p:sp>
+      <p:cxnSp>
+        <p:nvCxnSpPr>
+          <p:cNvPr id="47" name="Straight Connector 46"/>
+          <p:cNvCxnSpPr/>
+          <p:nvPr/>
+        </p:nvCxnSpPr>
+        <p:spPr>
+          <a:xfrm>
+            <a:off x="5786398" y="3455456"/>
+            <a:ext cx="2036717" cy="0"/>
+          </a:xfrm>
+          <a:prstGeom prst="line">
+            <a:avLst/>
+          </a:prstGeom>
+          <a:effectLst/>
+        </p:spPr>
+        <p:style>
+          <a:lnRef idx="2">
+            <a:schemeClr val="dk1"/>
+          </a:lnRef>
+          <a:fillRef idx="0">
+            <a:schemeClr val="dk1"/>
+          </a:fillRef>
+          <a:effectRef idx="1">
+            <a:schemeClr val="dk1"/>
+          </a:effectRef>
+          <a:fontRef idx="minor">
+            <a:schemeClr val="tx1"/>
+          </a:fontRef>
+        </p:style>
+      </p:cxnSp>
+      <p:sp>
+        <p:nvSpPr>
+          <p:cNvPr id="48" name="Rectangle 47"/>
+          <p:cNvSpPr/>
+          <p:nvPr/>
+        </p:nvSpPr>
+        <p:spPr>
+          <a:xfrm>
+            <a:off x="5783143" y="3074456"/>
+            <a:ext cx="2039489" cy="381000"/>
+          </a:xfrm>
+          <a:prstGeom prst="rect">
+            <a:avLst/>
+          </a:prstGeom>
+          <a:noFill/>
+          <a:ln>
+            <a:noFill/>
+          </a:ln>
+        </p:spPr>
+        <p:style>
+          <a:lnRef idx="2">
+            <a:schemeClr val="dk1"/>
+          </a:lnRef>
+          <a:fillRef idx="1">
+            <a:schemeClr val="lt1"/>
+          </a:fillRef>
+          <a:effectRef idx="0">
+            <a:schemeClr val="dk1"/>
+          </a:effectRef>
+          <a:fontRef idx="minor">
+            <a:schemeClr val="dk1"/>
+          </a:fontRef>
+        </p:style>
+        <p:txBody>
+          <a:bodyPr lIns="84902" tIns="42451" rIns="84902" bIns="42451" rtlCol="0" anchor="ctr"/>
+          <a:lstStyle/>
+          <a:p>
+            <a:pPr algn="ctr"/>
+            <a:r>
+              <a:rPr lang="en-US" dirty="0" smtClean="0">
+                <a:latin typeface="Monaco"/>
+                <a:cs typeface="Monaco"/>
+              </a:rPr>
+              <a:t>GameBoard</a:t>
+            </a:r>
+            <a:endParaRPr lang="en-US" dirty="0">
+              <a:latin typeface="Monaco"/>
+              <a:cs typeface="Monaco"/>
+            </a:endParaRPr>
+          </a:p>
+        </p:txBody>
+      </p:sp>
+      <p:sp>
+        <p:nvSpPr>
+          <p:cNvPr id="49" name="Rectangle 48"/>
+          <p:cNvSpPr/>
+          <p:nvPr/>
+        </p:nvSpPr>
+        <p:spPr>
+          <a:xfrm>
+            <a:off x="5783143" y="3469569"/>
+            <a:ext cx="2039489" cy="1287640"/>
+          </a:xfrm>
+          <a:prstGeom prst="rect">
+            <a:avLst/>
+          </a:prstGeom>
+          <a:noFill/>
+          <a:ln>
+            <a:noFill/>
+          </a:ln>
+        </p:spPr>
+        <p:style>
+          <a:lnRef idx="2">
+            <a:schemeClr val="dk1"/>
+          </a:lnRef>
+          <a:fillRef idx="1">
+            <a:schemeClr val="lt1"/>
+          </a:fillRef>
+          <a:effectRef idx="0">
+            <a:schemeClr val="dk1"/>
+          </a:effectRef>
+          <a:fontRef idx="minor">
+            <a:schemeClr val="dk1"/>
+          </a:fontRef>
+        </p:style>
+        <p:txBody>
+          <a:bodyPr lIns="84902" tIns="42451" rIns="84902" bIns="42451" rtlCol="0" anchor="t"/>
+          <a:lstStyle/>
+          <a:p>
+            <a:r>
+              <a:rPr lang="en-US" sz="900" dirty="0">
+                <a:latin typeface="Monaco"/>
+                <a:cs typeface="Monaco"/>
+              </a:rPr>
+              <a:t>- JButton[] boardButtons</a:t>
+            </a:r>
+          </a:p>
+          <a:p>
+            <a:r>
+              <a:rPr lang="en-US" sz="900" dirty="0">
+                <a:latin typeface="Monaco"/>
+                <a:cs typeface="Monaco"/>
+              </a:rPr>
+              <a:t>- Controller controller</a:t>
+            </a:r>
+          </a:p>
+          <a:p>
+            <a:r>
+              <a:rPr lang="en-US" sz="900" dirty="0">
+                <a:latin typeface="Monaco"/>
+                <a:cs typeface="Monaco"/>
+              </a:rPr>
+              <a:t>⎯⎯⎯⎯⎯⎯⎯⎯⎯⎯⎯⎯⎯⎯</a:t>
+            </a:r>
+          </a:p>
+          <a:p>
+            <a:r>
+              <a:rPr lang="en-US" sz="900" dirty="0">
+                <a:latin typeface="Monaco"/>
+                <a:cs typeface="Monaco"/>
+              </a:rPr>
+              <a:t>+ GameBoard(Controller): 	&lt;constructor&gt;</a:t>
+            </a:r>
+          </a:p>
+          <a:p>
+            <a:r>
+              <a:rPr lang="en-US" sz="900" dirty="0">
+                <a:latin typeface="Monaco"/>
+                <a:cs typeface="Monaco"/>
+              </a:rPr>
+              <a:t>- createButtons(): void</a:t>
+            </a:r>
+          </a:p>
+        </p:txBody>
+      </p:sp>
+      <p:cxnSp>
+        <p:nvCxnSpPr>
+          <p:cNvPr id="50" name="Straight Connector 49"/>
+          <p:cNvCxnSpPr/>
+          <p:nvPr/>
+        </p:nvCxnSpPr>
+        <p:spPr>
+          <a:xfrm flipH="1">
+            <a:off x="6798998" y="2774596"/>
+            <a:ext cx="569" cy="299863"/>
+          </a:xfrm>
+          <a:prstGeom prst="line">
+            <a:avLst/>
+          </a:prstGeom>
+          <a:effectLst/>
+        </p:spPr>
+        <p:style>
+          <a:lnRef idx="2">
+            <a:schemeClr val="dk1"/>
+          </a:lnRef>
+          <a:fillRef idx="0">
+            <a:schemeClr val="dk1"/>
+          </a:fillRef>
+          <a:effectRef idx="1">
+            <a:schemeClr val="dk1"/>
+          </a:effectRef>
+          <a:fontRef idx="minor">
+            <a:schemeClr val="tx1"/>
+          </a:fontRef>
+        </p:style>
+      </p:cxnSp>
+      <p:sp>
+        <p:nvSpPr>
+          <p:cNvPr id="58" name="Rounded Rectangle 57"/>
+          <p:cNvSpPr/>
+          <p:nvPr/>
+        </p:nvSpPr>
+        <p:spPr>
+          <a:xfrm>
+            <a:off x="5777469" y="673806"/>
+            <a:ext cx="2039489" cy="1682750"/>
+          </a:xfrm>
+          <a:prstGeom prst="roundRect">
+            <a:avLst/>
+          </a:prstGeom>
+        </p:spPr>
+        <p:style>
+          <a:lnRef idx="2">
+            <a:schemeClr val="dk1"/>
+          </a:lnRef>
+          <a:fillRef idx="1">
+            <a:schemeClr val="lt1"/>
+          </a:fillRef>
+          <a:effectRef idx="0">
+            <a:schemeClr val="dk1"/>
+          </a:effectRef>
+          <a:fontRef idx="minor">
+            <a:schemeClr val="dk1"/>
+          </a:fontRef>
+        </p:style>
+        <p:txBody>
+          <a:bodyPr lIns="84902" tIns="42451" rIns="84902" bIns="42451" rtlCol="0" anchor="ctr"/>
+          <a:lstStyle/>
+          <a:p>
+            <a:pPr algn="ctr"/>
+            <a:endParaRPr lang="en-US" dirty="0"/>
+          </a:p>
+        </p:txBody>
+      </p:sp>
+      <p:cxnSp>
+        <p:nvCxnSpPr>
+          <p:cNvPr id="59" name="Straight Connector 58"/>
+          <p:cNvCxnSpPr/>
+          <p:nvPr/>
+        </p:nvCxnSpPr>
+        <p:spPr>
+          <a:xfrm>
+            <a:off x="5780724" y="1054805"/>
+            <a:ext cx="2036717" cy="0"/>
+          </a:xfrm>
+          <a:prstGeom prst="line">
+            <a:avLst/>
+          </a:prstGeom>
+          <a:effectLst/>
+        </p:spPr>
+        <p:style>
+          <a:lnRef idx="2">
+            <a:schemeClr val="dk1"/>
+          </a:lnRef>
+          <a:fillRef idx="0">
+            <a:schemeClr val="dk1"/>
+          </a:fillRef>
+          <a:effectRef idx="1">
+            <a:schemeClr val="dk1"/>
+          </a:effectRef>
+          <a:fontRef idx="minor">
+            <a:schemeClr val="tx1"/>
+          </a:fontRef>
+        </p:style>
+      </p:cxnSp>
+      <p:sp>
+        <p:nvSpPr>
+          <p:cNvPr id="60" name="Rectangle 59"/>
+          <p:cNvSpPr/>
+          <p:nvPr/>
+        </p:nvSpPr>
+        <p:spPr>
+          <a:xfrm>
+            <a:off x="5777469" y="673805"/>
+            <a:ext cx="2039489" cy="381000"/>
+          </a:xfrm>
+          <a:prstGeom prst="rect">
+            <a:avLst/>
+          </a:prstGeom>
+          <a:noFill/>
+          <a:ln>
+            <a:noFill/>
+          </a:ln>
+        </p:spPr>
+        <p:style>
+          <a:lnRef idx="2">
+            <a:schemeClr val="dk1"/>
+          </a:lnRef>
+          <a:fillRef idx="1">
+            <a:schemeClr val="lt1"/>
+          </a:fillRef>
+          <a:effectRef idx="0">
+            <a:schemeClr val="dk1"/>
+          </a:effectRef>
+          <a:fontRef idx="minor">
+            <a:schemeClr val="dk1"/>
+          </a:fontRef>
+        </p:style>
+        <p:txBody>
+          <a:bodyPr lIns="84902" tIns="42451" rIns="84902" bIns="42451" rtlCol="0" anchor="ctr"/>
+          <a:lstStyle/>
+          <a:p>
+            <a:pPr algn="ctr"/>
+            <a:r>
+              <a:rPr lang="en-US" dirty="0" smtClean="0">
+                <a:latin typeface="Monaco"/>
+                <a:cs typeface="Monaco"/>
+              </a:rPr>
+              <a:t>TurnLabelPanel</a:t>
+            </a:r>
+            <a:endParaRPr lang="en-US" dirty="0">
+              <a:latin typeface="Monaco"/>
+              <a:cs typeface="Monaco"/>
+            </a:endParaRPr>
+          </a:p>
+        </p:txBody>
+      </p:sp>
+      <p:sp>
+        <p:nvSpPr>
+          <p:cNvPr id="61" name="Rectangle 60"/>
+          <p:cNvSpPr/>
+          <p:nvPr/>
+        </p:nvSpPr>
+        <p:spPr>
+          <a:xfrm>
+            <a:off x="5777469" y="1068917"/>
+            <a:ext cx="2039489" cy="1287640"/>
+          </a:xfrm>
+          <a:prstGeom prst="rect">
+            <a:avLst/>
+          </a:prstGeom>
+          <a:noFill/>
+          <a:ln>
+            <a:noFill/>
+          </a:ln>
+        </p:spPr>
+        <p:style>
+          <a:lnRef idx="2">
+            <a:schemeClr val="dk1"/>
+          </a:lnRef>
+          <a:fillRef idx="1">
+            <a:schemeClr val="lt1"/>
+          </a:fillRef>
+          <a:effectRef idx="0">
+            <a:schemeClr val="dk1"/>
+          </a:effectRef>
+          <a:fontRef idx="minor">
+            <a:schemeClr val="dk1"/>
+          </a:fontRef>
+        </p:style>
+        <p:txBody>
+          <a:bodyPr lIns="84902" tIns="42451" rIns="84902" bIns="42451" rtlCol="0" anchor="t"/>
+          <a:lstStyle/>
+          <a:p>
+            <a:r>
+              <a:rPr lang="en-US" sz="900" dirty="0">
+                <a:latin typeface="Monaco"/>
+                <a:cs typeface="Monaco"/>
+              </a:rPr>
+              <a:t>- </a:t>
+            </a:r>
+            <a:r>
+              <a:rPr lang="en-US" sz="900" dirty="0" smtClean="0">
+                <a:latin typeface="Monaco"/>
+                <a:cs typeface="Monaco"/>
+              </a:rPr>
+              <a:t>JLabel turnLabel</a:t>
+            </a:r>
+            <a:endParaRPr lang="en-US" sz="900" dirty="0">
+              <a:latin typeface="Monaco"/>
+              <a:cs typeface="Monaco"/>
+            </a:endParaRPr>
+          </a:p>
+          <a:p>
+            <a:r>
+              <a:rPr lang="en-US" sz="900" dirty="0">
+                <a:latin typeface="Monaco"/>
+                <a:cs typeface="Monaco"/>
+              </a:rPr>
+              <a:t>⎯⎯⎯⎯⎯⎯⎯⎯⎯⎯⎯⎯⎯⎯</a:t>
+            </a:r>
+          </a:p>
+          <a:p>
+            <a:r>
+              <a:rPr lang="en-US" sz="900" dirty="0">
+                <a:latin typeface="Monaco"/>
+                <a:cs typeface="Monaco"/>
+              </a:rPr>
+              <a:t>+ </a:t>
+            </a:r>
+            <a:r>
+              <a:rPr lang="en-US" sz="900" dirty="0" smtClean="0">
+                <a:latin typeface="Monaco"/>
+                <a:cs typeface="Monaco"/>
+              </a:rPr>
+              <a:t>TurnLabelPanel()</a:t>
+            </a:r>
+            <a:r>
+              <a:rPr lang="en-US" sz="900" dirty="0">
+                <a:latin typeface="Monaco"/>
+                <a:cs typeface="Monaco"/>
+              </a:rPr>
+              <a:t>: 	&lt;constructor&gt;</a:t>
+            </a:r>
+          </a:p>
+          <a:p>
+            <a:r>
+              <a:rPr lang="en-US" sz="900" dirty="0" smtClean="0">
+                <a:latin typeface="Monaco"/>
+                <a:cs typeface="Monaco"/>
+              </a:rPr>
+              <a:t>+ setTurn(int turn)</a:t>
+            </a:r>
+            <a:r>
+              <a:rPr lang="en-US" sz="900" dirty="0">
+                <a:latin typeface="Monaco"/>
+                <a:cs typeface="Monaco"/>
+              </a:rPr>
+              <a:t>: void</a:t>
+            </a:r>
+          </a:p>
+        </p:txBody>
+      </p:sp>
+      <p:sp>
+        <p:nvSpPr>
+          <p:cNvPr id="69" name="Isosceles Triangle 68"/>
+          <p:cNvSpPr/>
+          <p:nvPr/>
+        </p:nvSpPr>
+        <p:spPr>
+          <a:xfrm rot="16200000">
+            <a:off x="3267363" y="1388535"/>
+            <a:ext cx="339724" cy="234596"/>
+          </a:xfrm>
+          <a:prstGeom prst="triangle">
+            <a:avLst/>
+          </a:prstGeom>
+          <a:noFill/>
+        </p:spPr>
+        <p:style>
+          <a:lnRef idx="2">
+            <a:schemeClr val="dk1">
+              <a:shade val="50000"/>
+            </a:schemeClr>
+          </a:lnRef>
+          <a:fillRef idx="1">
+            <a:schemeClr val="dk1"/>
+          </a:fillRef>
+          <a:effectRef idx="0">
+            <a:schemeClr val="dk1"/>
+          </a:effectRef>
+          <a:fontRef idx="minor">
+            <a:schemeClr val="lt1"/>
+          </a:fontRef>
+        </p:style>
+        <p:txBody>
+          <a:bodyPr lIns="84902" tIns="42451" rIns="84902" bIns="42451" spcCol="0" rtlCol="0" anchor="ctr"/>
+          <a:lstStyle/>
+          <a:p>
+            <a:pPr algn="ctr"/>
+            <a:endParaRPr lang="en-US" dirty="0"/>
+          </a:p>
+        </p:txBody>
+      </p:sp>
+      <p:cxnSp>
+        <p:nvCxnSpPr>
+          <p:cNvPr id="70" name="Straight Connector 69"/>
+          <p:cNvCxnSpPr>
+            <a:endCxn id="58" idx="1"/>
+          </p:cNvCxnSpPr>
+          <p:nvPr/>
+        </p:nvCxnSpPr>
+        <p:spPr>
+          <a:xfrm flipV="1">
+            <a:off x="3554523" y="1515181"/>
+            <a:ext cx="2222946" cy="6002"/>
+          </a:xfrm>
+          <a:prstGeom prst="line">
+            <a:avLst/>
+          </a:prstGeom>
+          <a:effectLst/>
+        </p:spPr>
+        <p:style>
+          <a:lnRef idx="2">
+            <a:schemeClr val="dk1"/>
+          </a:lnRef>
+          <a:fillRef idx="0">
+            <a:schemeClr val="dk1"/>
+          </a:fillRef>
+          <a:effectRef idx="1">
+            <a:schemeClr val="dk1"/>
+          </a:effectRef>
+          <a:fontRef idx="minor">
+            <a:schemeClr val="tx1"/>
+          </a:fontRef>
+        </p:style>
+      </p:cxnSp>
+    </p:spTree>
+    <p:extLst>
+      <p:ext uri="{BB962C8B-B14F-4D97-AF65-F5344CB8AC3E}">
+        <p14:creationId xmlns:p14="http://schemas.microsoft.com/office/powerpoint/2010/main" val="4212330594"/>
+      </p:ext>
+    </p:extLst>
+  </p:cSld>
+  <p:clrMapOvr>
+    <a:masterClrMapping/>
+  </p:clrMapOvr>
+</p:sld>
+</file>
+
+<file path=ppt/slides/slide3.xml><?xml version="1.0" encoding="utf-8"?>
+<p:sld xmlns:a="http://schemas.openxmlformats.org/drawingml/2006/main" xmlns:r="http://schemas.openxmlformats.org/officeDocument/2006/relationships" xmlns:p="http://schemas.openxmlformats.org/presentationml/2006/main">
+  <p:cSld>
+    <p:spTree>
+      <p:nvGrpSpPr>
+        <p:cNvPr id="1" name=""/>
+        <p:cNvGrpSpPr/>
+        <p:nvPr/>
+      </p:nvGrpSpPr>
+      <p:grpSpPr>
+        <a:xfrm>
+          <a:off x="0" y="0"/>
+          <a:ext cx="0" cy="0"/>
+          <a:chOff x="0" y="0"/>
+          <a:chExt cx="0" cy="0"/>
+        </a:xfrm>
+      </p:grpSpPr>
+      <p:sp>
+        <p:nvSpPr>
+          <p:cNvPr id="25" name="Rounded Rectangle 24"/>
+          <p:cNvSpPr/>
+          <p:nvPr/>
+        </p:nvSpPr>
+        <p:spPr>
+          <a:xfrm>
+            <a:off x="584041" y="866070"/>
+            <a:ext cx="2740104" cy="381000"/>
+          </a:xfrm>
+          <a:prstGeom prst="roundRect">
+            <a:avLst/>
+          </a:prstGeom>
+        </p:spPr>
+        <p:style>
+          <a:lnRef idx="2">
+            <a:schemeClr val="dk1"/>
+          </a:lnRef>
+          <a:fillRef idx="1">
+            <a:schemeClr val="lt1"/>
+          </a:fillRef>
+          <a:effectRef idx="0">
+            <a:schemeClr val="dk1"/>
+          </a:effectRef>
+          <a:fontRef idx="minor">
+            <a:schemeClr val="dk1"/>
+          </a:fontRef>
+        </p:style>
+        <p:txBody>
+          <a:bodyPr lIns="84902" tIns="42451" rIns="84902" bIns="42451" rtlCol="0" anchor="ctr"/>
+          <a:lstStyle/>
+          <a:p>
+            <a:pPr algn="ctr"/>
+            <a:endParaRPr lang="en-US" dirty="0"/>
+          </a:p>
+        </p:txBody>
+      </p:sp>
+      <p:sp>
+        <p:nvSpPr>
+          <p:cNvPr id="26" name="Rectangle 25"/>
+          <p:cNvSpPr/>
+          <p:nvPr/>
+        </p:nvSpPr>
+        <p:spPr>
+          <a:xfrm>
+            <a:off x="584041" y="866069"/>
+            <a:ext cx="2740104" cy="381000"/>
+          </a:xfrm>
+          <a:prstGeom prst="rect">
+            <a:avLst/>
+          </a:prstGeom>
+          <a:noFill/>
+          <a:ln>
+            <a:noFill/>
+          </a:ln>
+        </p:spPr>
+        <p:style>
+          <a:lnRef idx="2">
+            <a:schemeClr val="dk1"/>
+          </a:lnRef>
+          <a:fillRef idx="1">
+            <a:schemeClr val="lt1"/>
+          </a:fillRef>
+          <a:effectRef idx="0">
+            <a:schemeClr val="dk1"/>
+          </a:effectRef>
+          <a:fontRef idx="minor">
+            <a:schemeClr val="dk1"/>
+          </a:fontRef>
+        </p:style>
+        <p:txBody>
+          <a:bodyPr lIns="84902" tIns="42451" rIns="84902" bIns="42451" rtlCol="0" anchor="ctr"/>
+          <a:lstStyle/>
+          <a:p>
+            <a:pPr algn="ctr"/>
+            <a:r>
+              <a:rPr lang="en-US" dirty="0" smtClean="0">
+                <a:latin typeface="Monaco"/>
+                <a:cs typeface="Monaco"/>
+              </a:rPr>
+              <a:t>JButton</a:t>
+            </a:r>
+            <a:endParaRPr lang="en-US" dirty="0">
+              <a:latin typeface="Monaco"/>
+              <a:cs typeface="Monaco"/>
+            </a:endParaRPr>
+          </a:p>
+        </p:txBody>
+      </p:sp>
+      <p:sp>
+        <p:nvSpPr>
+          <p:cNvPr id="27" name="Rectangle 26"/>
+          <p:cNvSpPr/>
+          <p:nvPr/>
+        </p:nvSpPr>
+        <p:spPr>
+          <a:xfrm>
+            <a:off x="584041" y="485069"/>
+            <a:ext cx="2740104" cy="381000"/>
+          </a:xfrm>
+          <a:prstGeom prst="rect">
+            <a:avLst/>
+          </a:prstGeom>
+          <a:noFill/>
+          <a:ln>
+            <a:noFill/>
+          </a:ln>
+        </p:spPr>
+        <p:style>
+          <a:lnRef idx="2">
+            <a:schemeClr val="dk1"/>
+          </a:lnRef>
+          <a:fillRef idx="1">
+            <a:schemeClr val="lt1"/>
+          </a:fillRef>
+          <a:effectRef idx="0">
+            <a:schemeClr val="dk1"/>
+          </a:effectRef>
+          <a:fontRef idx="minor">
+            <a:schemeClr val="dk1"/>
+          </a:fontRef>
+        </p:style>
+        <p:txBody>
+          <a:bodyPr lIns="84902" tIns="42451" rIns="84902" bIns="42451" rtlCol="0" anchor="ctr"/>
+          <a:lstStyle/>
+          <a:p>
+            <a:pPr algn="ctr"/>
+            <a:r>
+              <a:rPr lang="en-US" dirty="0" smtClean="0">
+                <a:latin typeface="Monaco"/>
+                <a:cs typeface="Monaco"/>
+              </a:rPr>
+              <a:t>&lt;</a:t>
+            </a:r>
+            <a:r>
+              <a:rPr lang="en-US" dirty="0" smtClean="0">
+                <a:latin typeface="Monaco"/>
+                <a:cs typeface="Monaco"/>
+              </a:rPr>
+              <a:t>&lt;interface&gt;</a:t>
+            </a:r>
+            <a:r>
+              <a:rPr lang="en-US" dirty="0" smtClean="0">
+                <a:latin typeface="Monaco"/>
+                <a:cs typeface="Monaco"/>
+              </a:rPr>
+              <a:t>&gt;</a:t>
+            </a:r>
+            <a:endParaRPr lang="en-US" dirty="0">
+              <a:latin typeface="Monaco"/>
+              <a:cs typeface="Monaco"/>
+            </a:endParaRPr>
+          </a:p>
+        </p:txBody>
+      </p:sp>
+      <p:cxnSp>
+        <p:nvCxnSpPr>
+          <p:cNvPr id="28" name="Straight Connector 27"/>
+          <p:cNvCxnSpPr>
+            <a:stCxn id="29" idx="3"/>
+          </p:cNvCxnSpPr>
+          <p:nvPr/>
+        </p:nvCxnSpPr>
+        <p:spPr>
+          <a:xfrm>
+            <a:off x="1956130" y="1481665"/>
+            <a:ext cx="0" cy="254002"/>
+          </a:xfrm>
+          <a:prstGeom prst="line">
+            <a:avLst/>
+          </a:prstGeom>
+          <a:effectLst/>
+        </p:spPr>
+        <p:style>
+          <a:lnRef idx="2">
+            <a:schemeClr val="dk1"/>
+          </a:lnRef>
+          <a:fillRef idx="0">
+            <a:schemeClr val="dk1"/>
+          </a:fillRef>
+          <a:effectRef idx="1">
+            <a:schemeClr val="dk1"/>
+          </a:effectRef>
+          <a:fontRef idx="minor">
+            <a:schemeClr val="tx1"/>
+          </a:fontRef>
+        </p:style>
+      </p:cxnSp>
+      <p:sp>
+        <p:nvSpPr>
+          <p:cNvPr id="29" name="Isosceles Triangle 28"/>
+          <p:cNvSpPr/>
+          <p:nvPr/>
+        </p:nvSpPr>
+        <p:spPr>
+          <a:xfrm>
+            <a:off x="1786268" y="1247070"/>
+            <a:ext cx="339724" cy="234596"/>
+          </a:xfrm>
+          <a:prstGeom prst="triangle">
+            <a:avLst/>
+          </a:prstGeom>
+          <a:noFill/>
+        </p:spPr>
+        <p:style>
+          <a:lnRef idx="2">
+            <a:schemeClr val="dk1">
+              <a:shade val="50000"/>
+            </a:schemeClr>
+          </a:lnRef>
+          <a:fillRef idx="1">
+            <a:schemeClr val="dk1"/>
+          </a:fillRef>
+          <a:effectRef idx="0">
+            <a:schemeClr val="dk1"/>
+          </a:effectRef>
+          <a:fontRef idx="minor">
+            <a:schemeClr val="lt1"/>
+          </a:fontRef>
+        </p:style>
+        <p:txBody>
+          <a:bodyPr lIns="84902" tIns="42451" rIns="84902" bIns="42451" spcCol="0" rtlCol="0" anchor="ctr"/>
+          <a:lstStyle/>
+          <a:p>
+            <a:pPr algn="ctr"/>
+            <a:endParaRPr lang="en-US" dirty="0"/>
+          </a:p>
+        </p:txBody>
+      </p:sp>
+      <p:sp>
+        <p:nvSpPr>
+          <p:cNvPr id="30" name="Rounded Rectangle 29"/>
+          <p:cNvSpPr/>
+          <p:nvPr/>
+        </p:nvSpPr>
+        <p:spPr>
+          <a:xfrm>
+            <a:off x="758586" y="1735667"/>
+            <a:ext cx="2395089" cy="1682750"/>
+          </a:xfrm>
+          <a:prstGeom prst="roundRect">
+            <a:avLst/>
+          </a:prstGeom>
+        </p:spPr>
+        <p:style>
+          <a:lnRef idx="2">
+            <a:schemeClr val="dk1"/>
+          </a:lnRef>
+          <a:fillRef idx="1">
+            <a:schemeClr val="lt1"/>
+          </a:fillRef>
+          <a:effectRef idx="0">
+            <a:schemeClr val="dk1"/>
+          </a:effectRef>
+          <a:fontRef idx="minor">
+            <a:schemeClr val="dk1"/>
+          </a:fontRef>
+        </p:style>
+        <p:txBody>
+          <a:bodyPr lIns="84902" tIns="42451" rIns="84902" bIns="42451" rtlCol="0" anchor="ctr"/>
+          <a:lstStyle/>
+          <a:p>
+            <a:pPr algn="ctr"/>
+            <a:endParaRPr lang="en-US" dirty="0"/>
+          </a:p>
+        </p:txBody>
+      </p:sp>
+      <p:cxnSp>
+        <p:nvCxnSpPr>
+          <p:cNvPr id="31" name="Straight Connector 30"/>
+          <p:cNvCxnSpPr/>
+          <p:nvPr/>
+        </p:nvCxnSpPr>
+        <p:spPr>
+          <a:xfrm>
+            <a:off x="761840" y="2116667"/>
+            <a:ext cx="2391834" cy="0"/>
+          </a:xfrm>
+          <a:prstGeom prst="line">
+            <a:avLst/>
+          </a:prstGeom>
+          <a:effectLst/>
+        </p:spPr>
+        <p:style>
+          <a:lnRef idx="2">
+            <a:schemeClr val="dk1"/>
+          </a:lnRef>
+          <a:fillRef idx="0">
+            <a:schemeClr val="dk1"/>
+          </a:fillRef>
+          <a:effectRef idx="1">
+            <a:schemeClr val="dk1"/>
+          </a:effectRef>
+          <a:fontRef idx="minor">
+            <a:schemeClr val="tx1"/>
+          </a:fontRef>
+        </p:style>
+      </p:cxnSp>
+      <p:sp>
+        <p:nvSpPr>
+          <p:cNvPr id="32" name="Rectangle 31"/>
+          <p:cNvSpPr/>
+          <p:nvPr/>
+        </p:nvSpPr>
+        <p:spPr>
+          <a:xfrm>
+            <a:off x="758586" y="1735667"/>
+            <a:ext cx="2395089" cy="381000"/>
+          </a:xfrm>
+          <a:prstGeom prst="rect">
+            <a:avLst/>
+          </a:prstGeom>
+          <a:noFill/>
+          <a:ln>
+            <a:noFill/>
+          </a:ln>
+        </p:spPr>
+        <p:style>
+          <a:lnRef idx="2">
+            <a:schemeClr val="dk1"/>
+          </a:lnRef>
+          <a:fillRef idx="1">
+            <a:schemeClr val="lt1"/>
+          </a:fillRef>
+          <a:effectRef idx="0">
+            <a:schemeClr val="dk1"/>
+          </a:effectRef>
+          <a:fontRef idx="minor">
+            <a:schemeClr val="dk1"/>
+          </a:fontRef>
+        </p:style>
+        <p:txBody>
+          <a:bodyPr lIns="84902" tIns="42451" rIns="84902" bIns="42451" rtlCol="0" anchor="ctr"/>
+          <a:lstStyle/>
+          <a:p>
+            <a:pPr algn="ctr"/>
+            <a:r>
+              <a:rPr lang="en-US" dirty="0" smtClean="0">
+                <a:latin typeface="Monaco"/>
+                <a:cs typeface="Monaco"/>
+              </a:rPr>
+              <a:t>BoardButton</a:t>
+            </a:r>
+            <a:endParaRPr lang="en-US" dirty="0">
+              <a:latin typeface="Monaco"/>
+              <a:cs typeface="Monaco"/>
+            </a:endParaRPr>
+          </a:p>
+        </p:txBody>
+      </p:sp>
+      <p:sp>
+        <p:nvSpPr>
+          <p:cNvPr id="33" name="Rectangle 32"/>
+          <p:cNvSpPr/>
+          <p:nvPr/>
+        </p:nvSpPr>
+        <p:spPr>
+          <a:xfrm>
+            <a:off x="758586" y="2130779"/>
+            <a:ext cx="2395089" cy="1287640"/>
+          </a:xfrm>
+          <a:prstGeom prst="rect">
+            <a:avLst/>
+          </a:prstGeom>
+          <a:noFill/>
+          <a:ln>
+            <a:noFill/>
+          </a:ln>
+        </p:spPr>
+        <p:style>
+          <a:lnRef idx="2">
+            <a:schemeClr val="dk1"/>
+          </a:lnRef>
+          <a:fillRef idx="1">
+            <a:schemeClr val="lt1"/>
+          </a:fillRef>
+          <a:effectRef idx="0">
+            <a:schemeClr val="dk1"/>
+          </a:effectRef>
+          <a:fontRef idx="minor">
+            <a:schemeClr val="dk1"/>
+          </a:fontRef>
+        </p:style>
+        <p:txBody>
+          <a:bodyPr lIns="84902" tIns="42451" rIns="84902" bIns="42451" rtlCol="0" anchor="t"/>
+          <a:lstStyle/>
+          <a:p>
+            <a:r>
+              <a:rPr lang="en-US" sz="900" dirty="0">
+                <a:latin typeface="Monaco"/>
+                <a:cs typeface="Monaco"/>
+              </a:rPr>
+              <a:t>- int buttonID</a:t>
+            </a:r>
+          </a:p>
+          <a:p>
+            <a:r>
+              <a:rPr lang="en-US" sz="900" dirty="0">
+                <a:latin typeface="Monaco"/>
+                <a:cs typeface="Monaco"/>
+              </a:rPr>
+              <a:t>- Controller controller</a:t>
+            </a:r>
+          </a:p>
+          <a:p>
+            <a:r>
+              <a:rPr lang="en-US" sz="900" dirty="0">
+                <a:latin typeface="Monaco"/>
+                <a:cs typeface="Monaco"/>
+              </a:rPr>
+              <a:t>⎯⎯⎯⎯⎯⎯⎯⎯⎯⎯⎯⎯⎯⎯⎯⎯</a:t>
+            </a:r>
+          </a:p>
+          <a:p>
+            <a:r>
+              <a:rPr lang="en-US" sz="900" dirty="0">
+                <a:latin typeface="Monaco"/>
+                <a:cs typeface="Monaco"/>
+              </a:rPr>
+              <a:t>+ BoardButton(Controller): 	&lt;constructor&gt;</a:t>
+            </a:r>
+          </a:p>
+          <a:p>
+            <a:r>
+              <a:rPr lang="en-US" sz="900" dirty="0">
+                <a:latin typeface="Monaco"/>
+                <a:cs typeface="Monaco"/>
+              </a:rPr>
+              <a:t>+ setButtonState(boolean 	state): void</a:t>
+            </a:r>
+          </a:p>
+          <a:p>
+            <a:r>
+              <a:rPr lang="en-US" sz="900" dirty="0">
+                <a:latin typeface="Monaco"/>
+                <a:cs typeface="Monaco"/>
+              </a:rPr>
+              <a:t>+ setButtonText(String text): 	void</a:t>
+            </a:r>
+          </a:p>
+        </p:txBody>
+      </p:sp>
+    </p:spTree>
+    <p:extLst>
+      <p:ext uri="{BB962C8B-B14F-4D97-AF65-F5344CB8AC3E}">
+        <p14:creationId xmlns:p14="http://schemas.microsoft.com/office/powerpoint/2010/main" val="2749346416"/>
       </p:ext>
     </p:extLst>
   </p:cSld>

</xml_diff>

<commit_message>
Update controller class diagram
</commit_message>
<xml_diff>
--- a/Class UML diagrams/Controller.pptx
+++ b/Class UML diagrams/Controller.pptx
@@ -194,7 +194,7 @@
           <a:p>
             <a:fld id="{6DC0ABFD-927F-5E49-8195-2EED5AFEE728}" type="datetimeFigureOut">
               <a:rPr lang="en-US" smtClean="0"/>
-              <a:t>23/03/14</a:t>
+              <a:t>24/03/14</a:t>
             </a:fld>
             <a:endParaRPr lang="en-US" dirty="0"/>
           </a:p>
@@ -732,7 +732,7 @@
           <a:p>
             <a:fld id="{E1D2620B-6619-314E-A368-62BBC874E253}" type="datetimeFigureOut">
               <a:rPr lang="en-US" smtClean="0"/>
-              <a:t>23/03/14</a:t>
+              <a:t>24/03/14</a:t>
             </a:fld>
             <a:endParaRPr lang="en-US" dirty="0"/>
           </a:p>
@@ -902,7 +902,7 @@
           <a:p>
             <a:fld id="{E1D2620B-6619-314E-A368-62BBC874E253}" type="datetimeFigureOut">
               <a:rPr lang="en-US" smtClean="0"/>
-              <a:t>23/03/14</a:t>
+              <a:t>24/03/14</a:t>
             </a:fld>
             <a:endParaRPr lang="en-US" dirty="0"/>
           </a:p>
@@ -1082,7 +1082,7 @@
           <a:p>
             <a:fld id="{E1D2620B-6619-314E-A368-62BBC874E253}" type="datetimeFigureOut">
               <a:rPr lang="en-US" smtClean="0"/>
-              <a:t>23/03/14</a:t>
+              <a:t>24/03/14</a:t>
             </a:fld>
             <a:endParaRPr lang="en-US" dirty="0"/>
           </a:p>
@@ -1252,7 +1252,7 @@
           <a:p>
             <a:fld id="{E1D2620B-6619-314E-A368-62BBC874E253}" type="datetimeFigureOut">
               <a:rPr lang="en-US" smtClean="0"/>
-              <a:t>23/03/14</a:t>
+              <a:t>24/03/14</a:t>
             </a:fld>
             <a:endParaRPr lang="en-US" dirty="0"/>
           </a:p>
@@ -1498,7 +1498,7 @@
           <a:p>
             <a:fld id="{E1D2620B-6619-314E-A368-62BBC874E253}" type="datetimeFigureOut">
               <a:rPr lang="en-US" smtClean="0"/>
-              <a:t>23/03/14</a:t>
+              <a:t>24/03/14</a:t>
             </a:fld>
             <a:endParaRPr lang="en-US" dirty="0"/>
           </a:p>
@@ -1786,7 +1786,7 @@
           <a:p>
             <a:fld id="{E1D2620B-6619-314E-A368-62BBC874E253}" type="datetimeFigureOut">
               <a:rPr lang="en-US" smtClean="0"/>
-              <a:t>23/03/14</a:t>
+              <a:t>24/03/14</a:t>
             </a:fld>
             <a:endParaRPr lang="en-US" dirty="0"/>
           </a:p>
@@ -2208,7 +2208,7 @@
           <a:p>
             <a:fld id="{E1D2620B-6619-314E-A368-62BBC874E253}" type="datetimeFigureOut">
               <a:rPr lang="en-US" smtClean="0"/>
-              <a:t>23/03/14</a:t>
+              <a:t>24/03/14</a:t>
             </a:fld>
             <a:endParaRPr lang="en-US" dirty="0"/>
           </a:p>
@@ -2326,7 +2326,7 @@
           <a:p>
             <a:fld id="{E1D2620B-6619-314E-A368-62BBC874E253}" type="datetimeFigureOut">
               <a:rPr lang="en-US" smtClean="0"/>
-              <a:t>23/03/14</a:t>
+              <a:t>24/03/14</a:t>
             </a:fld>
             <a:endParaRPr lang="en-US" dirty="0"/>
           </a:p>
@@ -2421,7 +2421,7 @@
           <a:p>
             <a:fld id="{E1D2620B-6619-314E-A368-62BBC874E253}" type="datetimeFigureOut">
               <a:rPr lang="en-US" smtClean="0"/>
-              <a:t>23/03/14</a:t>
+              <a:t>24/03/14</a:t>
             </a:fld>
             <a:endParaRPr lang="en-US" dirty="0"/>
           </a:p>
@@ -2698,7 +2698,7 @@
           <a:p>
             <a:fld id="{E1D2620B-6619-314E-A368-62BBC874E253}" type="datetimeFigureOut">
               <a:rPr lang="en-US" smtClean="0"/>
-              <a:t>23/03/14</a:t>
+              <a:t>24/03/14</a:t>
             </a:fld>
             <a:endParaRPr lang="en-US" dirty="0"/>
           </a:p>
@@ -2951,7 +2951,7 @@
           <a:p>
             <a:fld id="{E1D2620B-6619-314E-A368-62BBC874E253}" type="datetimeFigureOut">
               <a:rPr lang="en-US" smtClean="0"/>
-              <a:t>23/03/14</a:t>
+              <a:t>24/03/14</a:t>
             </a:fld>
             <a:endParaRPr lang="en-US" dirty="0"/>
           </a:p>
@@ -3164,7 +3164,7 @@
           <a:p>
             <a:fld id="{E1D2620B-6619-314E-A368-62BBC874E253}" type="datetimeFigureOut">
               <a:rPr lang="en-US" smtClean="0"/>
-              <a:t>23/03/14</a:t>
+              <a:t>24/03/14</a:t>
             </a:fld>
             <a:endParaRPr lang="en-US" dirty="0"/>
           </a:p>
@@ -3796,14 +3796,16 @@
                 <a:latin typeface="Monaco"/>
                 <a:cs typeface="Monaco"/>
               </a:rPr>
-              <a:t>+</a:t>
-            </a:r>
+              <a:t>+ localGameButtonPressed(): void</a:t>
+            </a:r>
+          </a:p>
+          <a:p>
             <a:r>
               <a:rPr lang="en-US" sz="900" dirty="0">
                 <a:latin typeface="Monaco"/>
                 <a:cs typeface="Monaco"/>
               </a:rPr>
-              <a:t> localGameButtonPressed(): void</a:t>
+              <a:t>+ remoteGameButtonPressed(): void</a:t>
             </a:r>
           </a:p>
           <a:p>
@@ -3812,14 +3814,16 @@
                 <a:latin typeface="Monaco"/>
                 <a:cs typeface="Monaco"/>
               </a:rPr>
-              <a:t>+</a:t>
-            </a:r>
+              <a:t>+ hostGameButtonPressed(): void</a:t>
+            </a:r>
+          </a:p>
+          <a:p>
             <a:r>
               <a:rPr lang="en-US" sz="900" dirty="0">
                 <a:latin typeface="Monaco"/>
                 <a:cs typeface="Monaco"/>
               </a:rPr>
-              <a:t> remoteGameButtonPressed(): void</a:t>
+              <a:t>+ joinGameButtonPressed(): void</a:t>
             </a:r>
           </a:p>
           <a:p>
@@ -3828,14 +3832,16 @@
                 <a:latin typeface="Monaco"/>
                 <a:cs typeface="Monaco"/>
               </a:rPr>
-              <a:t>+</a:t>
-            </a:r>
+              <a:t>+ connectButtonPressed(String 	ipAddr, int port): void</a:t>
+            </a:r>
+          </a:p>
+          <a:p>
             <a:r>
               <a:rPr lang="en-US" sz="900" dirty="0">
                 <a:latin typeface="Monaco"/>
                 <a:cs typeface="Monaco"/>
               </a:rPr>
-              <a:t> hostGameButtonPressed(): void</a:t>
+              <a:t>+ boardButtonPressed(int 	buttonID): void</a:t>
             </a:r>
           </a:p>
           <a:p>
@@ -3844,71 +3850,16 @@
                 <a:latin typeface="Monaco"/>
                 <a:cs typeface="Monaco"/>
               </a:rPr>
-              <a:t>+</a:t>
-            </a:r>
+              <a:t>- createGame(): void</a:t>
+            </a:r>
+          </a:p>
+          <a:p>
             <a:r>
               <a:rPr lang="en-US" sz="900" dirty="0">
                 <a:latin typeface="Monaco"/>
                 <a:cs typeface="Monaco"/>
               </a:rPr>
-              <a:t> joinGameButtonPressed(): void</a:t>
-            </a:r>
-          </a:p>
-          <a:p>
-            <a:r>
-              <a:rPr lang="en-US" sz="900" dirty="0">
-                <a:latin typeface="Monaco"/>
-                <a:cs typeface="Monaco"/>
-              </a:rPr>
-              <a:t>+</a:t>
-            </a:r>
-            <a:r>
-              <a:rPr lang="en-US" sz="900" dirty="0">
-                <a:latin typeface="Monaco"/>
-                <a:cs typeface="Monaco"/>
-              </a:rPr>
-              <a:t> connectButtonPressed(String 	ipAddr, int port): void</a:t>
-            </a:r>
-          </a:p>
-          <a:p>
-            <a:r>
-              <a:rPr lang="en-US" sz="900" dirty="0">
-                <a:latin typeface="Monaco"/>
-                <a:cs typeface="Monaco"/>
-              </a:rPr>
-              <a:t>+ boardButtonPressed(int 	buttonID): void</a:t>
-            </a:r>
-          </a:p>
-          <a:p>
-            <a:r>
-              <a:rPr lang="en-US" sz="900" dirty="0">
-                <a:latin typeface="Monaco"/>
-                <a:cs typeface="Monaco"/>
-              </a:rPr>
-              <a:t>- createGame(): void</a:t>
-            </a:r>
-          </a:p>
-          <a:p>
-            <a:r>
-              <a:rPr lang="en-US" sz="900" dirty="0">
-                <a:latin typeface="Monaco"/>
-                <a:cs typeface="Monaco"/>
-              </a:rPr>
-              <a:t>- </a:t>
-            </a:r>
-            <a:r>
-              <a:rPr lang="en-US" sz="900" dirty="0">
-                <a:latin typeface="Monaco"/>
-                <a:cs typeface="Monaco"/>
-              </a:rPr>
-              <a:t>u</a:t>
-            </a:r>
-            <a:r>
-              <a:rPr lang="en-US" sz="900" dirty="0">
-                <a:latin typeface="Monaco"/>
-                <a:cs typeface="Monaco"/>
-              </a:rPr>
-              <a:t>pdateTurnLabel(): void</a:t>
+              <a:t>- updateTurnLabel(): void</a:t>
             </a:r>
           </a:p>
         </p:txBody>
@@ -4660,21 +4611,7 @@
                 <a:latin typeface="Monaco"/>
                 <a:cs typeface="Monaco"/>
               </a:rPr>
-              <a:t>&lt;</a:t>
-            </a:r>
-            <a:r>
-              <a:rPr lang="en-US" dirty="0" smtClean="0">
-                <a:latin typeface="Monaco"/>
-                <a:cs typeface="Monaco"/>
-              </a:rPr>
-              <a:t>&lt;interface&gt;</a:t>
-            </a:r>
-            <a:r>
-              <a:rPr lang="en-US" dirty="0" smtClean="0">
-                <a:latin typeface="Monaco"/>
-                <a:cs typeface="Monaco"/>
-              </a:rPr>
-              <a:t>&gt;</a:t>
+              <a:t>&lt;&lt;interface&gt;&gt;</a:t>
             </a:r>
             <a:endParaRPr lang="en-US" dirty="0">
               <a:latin typeface="Monaco"/>
@@ -4871,10 +4808,6 @@
               </a:rPr>
               <a:t>RemoteGameChoicePanel</a:t>
             </a:r>
-            <a:endParaRPr lang="en-US" sz="1400" dirty="0">
-              <a:latin typeface="Monaco"/>
-              <a:cs typeface="Monaco"/>
-            </a:endParaRPr>
           </a:p>
         </p:txBody>
       </p:sp>
@@ -5764,21 +5697,7 @@
                 <a:latin typeface="Monaco"/>
                 <a:cs typeface="Monaco"/>
               </a:rPr>
-              <a:t>&lt;</a:t>
-            </a:r>
-            <a:r>
-              <a:rPr lang="en-US" dirty="0" smtClean="0">
-                <a:latin typeface="Monaco"/>
-                <a:cs typeface="Monaco"/>
-              </a:rPr>
-              <a:t>&lt;interface&gt;</a:t>
-            </a:r>
-            <a:r>
-              <a:rPr lang="en-US" dirty="0" smtClean="0">
-                <a:latin typeface="Monaco"/>
-                <a:cs typeface="Monaco"/>
-              </a:rPr>
-              <a:t>&gt;</a:t>
+              <a:t>&lt;&lt;interface&gt;&gt;</a:t>
             </a:r>
             <a:endParaRPr lang="en-US" dirty="0">
               <a:latin typeface="Monaco"/>
@@ -6051,7 +5970,35 @@
                 <a:latin typeface="Monaco"/>
                 <a:cs typeface="Monaco"/>
               </a:rPr>
-              <a:t>+ BoardButton(Controller): 	&lt;constructor&gt;</a:t>
+              <a:t>+ BoardButton(</a:t>
+            </a:r>
+            <a:r>
+              <a:rPr lang="en-US" sz="900" dirty="0" smtClean="0">
+                <a:latin typeface="Monaco"/>
+                <a:cs typeface="Monaco"/>
+              </a:rPr>
+              <a:t>Controller, </a:t>
+            </a:r>
+            <a:r>
+              <a:rPr lang="en-US" sz="900" dirty="0" err="1" smtClean="0">
+                <a:latin typeface="Monaco"/>
+                <a:cs typeface="Monaco"/>
+              </a:rPr>
+              <a:t>int</a:t>
+            </a:r>
+            <a:r>
+              <a:rPr lang="en-US" sz="900" dirty="0" smtClean="0">
+                <a:latin typeface="Monaco"/>
+                <a:cs typeface="Monaco"/>
+              </a:rPr>
+              <a:t> 	id): &lt;</a:t>
+            </a:r>
+            <a:r>
+              <a:rPr lang="en-US" sz="900" dirty="0">
+                <a:latin typeface="Monaco"/>
+                <a:cs typeface="Monaco"/>
+              </a:rPr>
+              <a:t>constructor&gt;</a:t>
             </a:r>
           </a:p>
           <a:p>

</xml_diff>